<commit_message>
fix: serverless payment service image
</commit_message>
<xml_diff>
--- a/docs/nginx-serverless-payment.pptx
+++ b/docs/nginx-serverless-payment.pptx
@@ -5,7 +5,8 @@
     <p:sldMasterId id="2147483648" r:id="rId1"/>
   </p:sldMasterIdLst>
   <p:sldIdLst>
-    <p:sldId id="256" r:id="rId2"/>
+    <p:sldId id="257" r:id="rId2"/>
+    <p:sldId id="256" r:id="rId3"/>
   </p:sldIdLst>
   <p:sldSz cx="12192000" cy="6858000"/>
   <p:notesSz cx="6858000" cy="9144000"/>
@@ -104,6 +105,11 @@
       </a:defRPr>
     </a:lvl9pPr>
   </p:defaultTextStyle>
+  <p:extLst>
+    <p:ext uri="{EFAFB233-063F-42B5-8137-9DF3F51BA10A}">
+      <p15:sldGuideLst xmlns:p15="http://schemas.microsoft.com/office/powerpoint/2012/main"/>
+    </p:ext>
+  </p:extLst>
 </p:presentation>
 </file>
 
@@ -3326,6 +3332,3374 @@
           <p:cNvPr id="4" name="Picture 2" descr="Image result for nginx">
             <a:extLst>
               <a:ext uri="{FF2B5EF4-FFF2-40B4-BE49-F238E27FC236}">
+                <a16:creationId xmlns:a16="http://schemas.microsoft.com/office/drawing/2014/main" id="{F3250A87-71B0-6CD8-1791-2CF9BA8FB610}"/>
+              </a:ext>
+            </a:extLst>
+          </p:cNvPr>
+          <p:cNvPicPr>
+            <a:picLocks noChangeAspect="1" noChangeArrowheads="1"/>
+          </p:cNvPicPr>
+          <p:nvPr/>
+        </p:nvPicPr>
+        <p:blipFill>
+          <a:blip r:embed="rId2">
+            <a:extLst>
+              <a:ext uri="{28A0092B-C50C-407E-A947-70E740481C1C}">
+                <a14:useLocalDpi xmlns:a14="http://schemas.microsoft.com/office/drawing/2010/main" val="0"/>
+              </a:ext>
+            </a:extLst>
+          </a:blip>
+          <a:srcRect/>
+          <a:stretch>
+            <a:fillRect/>
+          </a:stretch>
+        </p:blipFill>
+        <p:spPr bwMode="auto">
+          <a:xfrm>
+            <a:off x="2044825" y="1947146"/>
+            <a:ext cx="512661" cy="595968"/>
+          </a:xfrm>
+          <a:prstGeom prst="rect">
+            <a:avLst/>
+          </a:prstGeom>
+          <a:noFill/>
+          <a:extLst>
+            <a:ext uri="{909E8E84-426E-40DD-AFC4-6F175D3DCCD1}">
+              <a14:hiddenFill xmlns:a14="http://schemas.microsoft.com/office/drawing/2010/main">
+                <a:solidFill>
+                  <a:srgbClr val="FFFFFF"/>
+                </a:solidFill>
+              </a14:hiddenFill>
+            </a:ext>
+          </a:extLst>
+        </p:spPr>
+      </p:pic>
+      <p:pic>
+        <p:nvPicPr>
+          <p:cNvPr id="5" name="Picture 2" descr="Image result for nginx">
+            <a:extLst>
+              <a:ext uri="{FF2B5EF4-FFF2-40B4-BE49-F238E27FC236}">
+                <a16:creationId xmlns:a16="http://schemas.microsoft.com/office/drawing/2014/main" id="{15FBAC99-3961-B2B0-398B-232301CAA02F}"/>
+              </a:ext>
+            </a:extLst>
+          </p:cNvPr>
+          <p:cNvPicPr>
+            <a:picLocks noChangeAspect="1" noChangeArrowheads="1"/>
+          </p:cNvPicPr>
+          <p:nvPr/>
+        </p:nvPicPr>
+        <p:blipFill>
+          <a:blip r:embed="rId2">
+            <a:extLst>
+              <a:ext uri="{28A0092B-C50C-407E-A947-70E740481C1C}">
+                <a14:useLocalDpi xmlns:a14="http://schemas.microsoft.com/office/drawing/2010/main" val="0"/>
+              </a:ext>
+            </a:extLst>
+          </a:blip>
+          <a:srcRect/>
+          <a:stretch>
+            <a:fillRect/>
+          </a:stretch>
+        </p:blipFill>
+        <p:spPr bwMode="auto">
+          <a:xfrm>
+            <a:off x="4085232" y="1903975"/>
+            <a:ext cx="512661" cy="595968"/>
+          </a:xfrm>
+          <a:prstGeom prst="rect">
+            <a:avLst/>
+          </a:prstGeom>
+          <a:noFill/>
+          <a:extLst>
+            <a:ext uri="{909E8E84-426E-40DD-AFC4-6F175D3DCCD1}">
+              <a14:hiddenFill xmlns:a14="http://schemas.microsoft.com/office/drawing/2010/main">
+                <a:solidFill>
+                  <a:srgbClr val="FFFFFF"/>
+                </a:solidFill>
+              </a14:hiddenFill>
+            </a:ext>
+          </a:extLst>
+        </p:spPr>
+      </p:pic>
+      <p:pic>
+        <p:nvPicPr>
+          <p:cNvPr id="6" name="Picture 4" descr="Image result for AWS Lambda">
+            <a:extLst>
+              <a:ext uri="{FF2B5EF4-FFF2-40B4-BE49-F238E27FC236}">
+                <a16:creationId xmlns:a16="http://schemas.microsoft.com/office/drawing/2014/main" id="{DEAE817D-7D73-B60B-0DCF-F1BFBEC556C4}"/>
+              </a:ext>
+            </a:extLst>
+          </p:cNvPr>
+          <p:cNvPicPr>
+            <a:picLocks noChangeAspect="1" noChangeArrowheads="1"/>
+          </p:cNvPicPr>
+          <p:nvPr/>
+        </p:nvPicPr>
+        <p:blipFill>
+          <a:blip r:embed="rId3">
+            <a:extLst>
+              <a:ext uri="{28A0092B-C50C-407E-A947-70E740481C1C}">
+                <a14:useLocalDpi xmlns:a14="http://schemas.microsoft.com/office/drawing/2010/main" val="0"/>
+              </a:ext>
+            </a:extLst>
+          </a:blip>
+          <a:srcRect/>
+          <a:stretch>
+            <a:fillRect/>
+          </a:stretch>
+        </p:blipFill>
+        <p:spPr bwMode="auto">
+          <a:xfrm>
+            <a:off x="6159543" y="2035508"/>
+            <a:ext cx="445665" cy="445665"/>
+          </a:xfrm>
+          <a:prstGeom prst="rect">
+            <a:avLst/>
+          </a:prstGeom>
+          <a:noFill/>
+          <a:extLst>
+            <a:ext uri="{909E8E84-426E-40DD-AFC4-6F175D3DCCD1}">
+              <a14:hiddenFill xmlns:a14="http://schemas.microsoft.com/office/drawing/2010/main">
+                <a:solidFill>
+                  <a:srgbClr val="FFFFFF"/>
+                </a:solidFill>
+              </a14:hiddenFill>
+            </a:ext>
+          </a:extLst>
+        </p:spPr>
+      </p:pic>
+      <p:sp>
+        <p:nvSpPr>
+          <p:cNvPr id="7" name="직사각형 256">
+            <a:extLst>
+              <a:ext uri="{FF2B5EF4-FFF2-40B4-BE49-F238E27FC236}">
+                <a16:creationId xmlns:a16="http://schemas.microsoft.com/office/drawing/2014/main" id="{BDED4A31-B379-D97D-6880-61E7FE03DEA1}"/>
+              </a:ext>
+            </a:extLst>
+          </p:cNvPr>
+          <p:cNvSpPr/>
+          <p:nvPr/>
+        </p:nvSpPr>
+        <p:spPr>
+          <a:xfrm>
+            <a:off x="1962665" y="2609569"/>
+            <a:ext cx="645113" cy="151388"/>
+          </a:xfrm>
+          <a:prstGeom prst="rect">
+            <a:avLst/>
+          </a:prstGeom>
+        </p:spPr>
+        <p:txBody>
+          <a:bodyPr wrap="none" lIns="0" tIns="0" rIns="0" bIns="0">
+            <a:spAutoFit/>
+          </a:bodyPr>
+          <a:lstStyle/>
+          <a:p>
+            <a:pPr>
+              <a:lnSpc>
+                <a:spcPct val="80000"/>
+              </a:lnSpc>
+            </a:pPr>
+            <a:r>
+              <a:rPr lang="en-US" altLang="ko-KR" sz="1200" dirty="0">
+                <a:solidFill>
+                  <a:prstClr val="black"/>
+                </a:solidFill>
+                <a:latin typeface="Calibri" panose="020F0502020204030204" pitchFamily="34" charset="0"/>
+              </a:rPr>
+              <a:t>Dev Portal</a:t>
+            </a:r>
+            <a:endParaRPr lang="ko-KR" altLang="en-US" sz="1200" dirty="0">
+              <a:solidFill>
+                <a:prstClr val="black"/>
+              </a:solidFill>
+              <a:latin typeface="Calibri" panose="020F0502020204030204" pitchFamily="34" charset="0"/>
+            </a:endParaRPr>
+          </a:p>
+        </p:txBody>
+      </p:sp>
+      <p:sp>
+        <p:nvSpPr>
+          <p:cNvPr id="8" name="직사각형 256">
+            <a:extLst>
+              <a:ext uri="{FF2B5EF4-FFF2-40B4-BE49-F238E27FC236}">
+                <a16:creationId xmlns:a16="http://schemas.microsoft.com/office/drawing/2014/main" id="{F93EAA7B-2925-A82A-9C52-3A9314865624}"/>
+              </a:ext>
+            </a:extLst>
+          </p:cNvPr>
+          <p:cNvSpPr/>
+          <p:nvPr/>
+        </p:nvSpPr>
+        <p:spPr>
+          <a:xfrm>
+            <a:off x="3629734" y="2615276"/>
+            <a:ext cx="1423659" cy="151388"/>
+          </a:xfrm>
+          <a:prstGeom prst="rect">
+            <a:avLst/>
+          </a:prstGeom>
+        </p:spPr>
+        <p:txBody>
+          <a:bodyPr wrap="none" lIns="0" tIns="0" rIns="0" bIns="0">
+            <a:spAutoFit/>
+          </a:bodyPr>
+          <a:lstStyle/>
+          <a:p>
+            <a:pPr algn="ctr">
+              <a:lnSpc>
+                <a:spcPct val="80000"/>
+              </a:lnSpc>
+            </a:pPr>
+            <a:r>
+              <a:rPr lang="en-US" altLang="ko-KR" sz="1200" dirty="0">
+                <a:solidFill>
+                  <a:prstClr val="black"/>
+                </a:solidFill>
+                <a:latin typeface="Calibri" panose="020F0502020204030204" pitchFamily="34" charset="0"/>
+              </a:rPr>
+              <a:t>nginx-lambda-gateway</a:t>
+            </a:r>
+            <a:endParaRPr lang="ko-KR" altLang="en-US" sz="1200" dirty="0">
+              <a:solidFill>
+                <a:prstClr val="black"/>
+              </a:solidFill>
+              <a:latin typeface="Calibri" panose="020F0502020204030204" pitchFamily="34" charset="0"/>
+            </a:endParaRPr>
+          </a:p>
+        </p:txBody>
+      </p:sp>
+      <p:sp>
+        <p:nvSpPr>
+          <p:cNvPr id="9" name="Can 8">
+            <a:extLst>
+              <a:ext uri="{FF2B5EF4-FFF2-40B4-BE49-F238E27FC236}">
+                <a16:creationId xmlns:a16="http://schemas.microsoft.com/office/drawing/2014/main" id="{D1184F29-0604-D514-156F-FB66EFA53B46}"/>
+              </a:ext>
+            </a:extLst>
+          </p:cNvPr>
+          <p:cNvSpPr/>
+          <p:nvPr/>
+        </p:nvSpPr>
+        <p:spPr>
+          <a:xfrm>
+            <a:off x="9102337" y="3972448"/>
+            <a:ext cx="1430452" cy="1501336"/>
+          </a:xfrm>
+          <a:prstGeom prst="can">
+            <a:avLst/>
+          </a:prstGeom>
+          <a:noFill/>
+        </p:spPr>
+        <p:style>
+          <a:lnRef idx="2">
+            <a:schemeClr val="accent1">
+              <a:shade val="50000"/>
+            </a:schemeClr>
+          </a:lnRef>
+          <a:fillRef idx="1">
+            <a:schemeClr val="accent1"/>
+          </a:fillRef>
+          <a:effectRef idx="0">
+            <a:schemeClr val="accent1"/>
+          </a:effectRef>
+          <a:fontRef idx="minor">
+            <a:schemeClr val="lt1"/>
+          </a:fontRef>
+        </p:style>
+        <p:txBody>
+          <a:bodyPr rtlCol="0" anchor="ctr"/>
+          <a:lstStyle/>
+          <a:p>
+            <a:pPr algn="ctr"/>
+            <a:r>
+              <a:rPr lang="en-US" sz="1100" dirty="0">
+                <a:solidFill>
+                  <a:schemeClr val="tx1"/>
+                </a:solidFill>
+              </a:rPr>
+              <a:t>Payment</a:t>
+            </a:r>
+          </a:p>
+          <a:p>
+            <a:pPr algn="ctr"/>
+            <a:r>
+              <a:rPr lang="en-US" sz="1100" dirty="0">
+                <a:solidFill>
+                  <a:schemeClr val="tx1"/>
+                </a:solidFill>
+              </a:rPr>
+              <a:t>DB</a:t>
+            </a:r>
+            <a:endParaRPr lang="en-US" sz="1000" dirty="0">
+              <a:solidFill>
+                <a:schemeClr val="tx1"/>
+              </a:solidFill>
+            </a:endParaRPr>
+          </a:p>
+          <a:p>
+            <a:pPr algn="ctr"/>
+            <a:endParaRPr lang="en-US" sz="1000" dirty="0">
+              <a:solidFill>
+                <a:schemeClr val="tx1"/>
+              </a:solidFill>
+            </a:endParaRPr>
+          </a:p>
+          <a:p>
+            <a:pPr algn="ctr"/>
+            <a:endParaRPr lang="en-US" sz="1000" dirty="0">
+              <a:solidFill>
+                <a:schemeClr val="tx1"/>
+              </a:solidFill>
+            </a:endParaRPr>
+          </a:p>
+          <a:p>
+            <a:pPr algn="ctr"/>
+            <a:endParaRPr lang="en-US" sz="1000" dirty="0">
+              <a:solidFill>
+                <a:schemeClr val="tx1"/>
+              </a:solidFill>
+            </a:endParaRPr>
+          </a:p>
+          <a:p>
+            <a:pPr algn="ctr"/>
+            <a:endParaRPr lang="en-US" sz="1000" dirty="0">
+              <a:solidFill>
+                <a:schemeClr val="tx1"/>
+              </a:solidFill>
+            </a:endParaRPr>
+          </a:p>
+        </p:txBody>
+      </p:sp>
+      <p:sp>
+        <p:nvSpPr>
+          <p:cNvPr id="10" name="직사각형 363">
+            <a:extLst>
+              <a:ext uri="{FF2B5EF4-FFF2-40B4-BE49-F238E27FC236}">
+                <a16:creationId xmlns:a16="http://schemas.microsoft.com/office/drawing/2014/main" id="{87BD5B6F-D87C-2C89-E79A-E61ED67E9935}"/>
+              </a:ext>
+            </a:extLst>
+          </p:cNvPr>
+          <p:cNvSpPr/>
+          <p:nvPr/>
+        </p:nvSpPr>
+        <p:spPr>
+          <a:xfrm rot="16200000">
+            <a:off x="271455" y="2922726"/>
+            <a:ext cx="4002709" cy="1444278"/>
+          </a:xfrm>
+          <a:prstGeom prst="rect">
+            <a:avLst/>
+          </a:prstGeom>
+          <a:noFill/>
+          <a:ln w="3175" cap="flat" cmpd="sng" algn="ctr">
+            <a:solidFill>
+              <a:schemeClr val="tx1">
+                <a:lumMod val="50000"/>
+                <a:lumOff val="50000"/>
+              </a:schemeClr>
+            </a:solidFill>
+            <a:prstDash val="dash"/>
+            <a:miter lim="800000"/>
+          </a:ln>
+          <a:effectLst/>
+        </p:spPr>
+        <p:txBody>
+          <a:bodyPr vert="vert" lIns="0" tIns="0" rIns="0" bIns="0" rtlCol="0" anchor="ctr"/>
+          <a:lstStyle/>
+          <a:p>
+            <a:pPr algn="ctr">
+              <a:lnSpc>
+                <a:spcPct val="80000"/>
+              </a:lnSpc>
+            </a:pPr>
+            <a:endParaRPr lang="ko-KR" altLang="en-US" sz="900" kern="0" dirty="0">
+              <a:solidFill>
+                <a:schemeClr val="bg1">
+                  <a:lumMod val="65000"/>
+                </a:schemeClr>
+              </a:solidFill>
+              <a:latin typeface="Calibri" panose="020F0502020204030204" pitchFamily="34" charset="0"/>
+              <a:ea typeface="맑은 고딕"/>
+            </a:endParaRPr>
+          </a:p>
+        </p:txBody>
+      </p:sp>
+      <p:pic>
+        <p:nvPicPr>
+          <p:cNvPr id="11" name="Picture 10">
+            <a:extLst>
+              <a:ext uri="{FF2B5EF4-FFF2-40B4-BE49-F238E27FC236}">
+                <a16:creationId xmlns:a16="http://schemas.microsoft.com/office/drawing/2014/main" id="{C8D594DC-21E5-E733-9732-413D4F0B8FB0}"/>
+              </a:ext>
+            </a:extLst>
+          </p:cNvPr>
+          <p:cNvPicPr>
+            <a:picLocks noChangeAspect="1"/>
+          </p:cNvPicPr>
+          <p:nvPr/>
+        </p:nvPicPr>
+        <p:blipFill>
+          <a:blip r:embed="rId4">
+            <a:extLst>
+              <a:ext uri="{BEBA8EAE-BF5A-486C-A8C5-ECC9F3942E4B}">
+                <a14:imgProps xmlns:a14="http://schemas.microsoft.com/office/drawing/2010/main">
+                  <a14:imgLayer r:embed="rId5">
+                    <a14:imgEffect>
+                      <a14:saturation sat="0"/>
+                    </a14:imgEffect>
+                  </a14:imgLayer>
+                </a14:imgProps>
+              </a:ext>
+            </a:extLst>
+          </a:blip>
+          <a:stretch>
+            <a:fillRect/>
+          </a:stretch>
+        </p:blipFill>
+        <p:spPr>
+          <a:xfrm>
+            <a:off x="1998634" y="3094826"/>
+            <a:ext cx="546084" cy="842154"/>
+          </a:xfrm>
+          <a:prstGeom prst="rect">
+            <a:avLst/>
+          </a:prstGeom>
+        </p:spPr>
+      </p:pic>
+      <p:pic>
+        <p:nvPicPr>
+          <p:cNvPr id="12" name="Picture 11">
+            <a:extLst>
+              <a:ext uri="{FF2B5EF4-FFF2-40B4-BE49-F238E27FC236}">
+                <a16:creationId xmlns:a16="http://schemas.microsoft.com/office/drawing/2014/main" id="{4C926922-4746-A531-47AE-CFEE0BE42F7F}"/>
+              </a:ext>
+            </a:extLst>
+          </p:cNvPr>
+          <p:cNvPicPr>
+            <a:picLocks noChangeAspect="1"/>
+          </p:cNvPicPr>
+          <p:nvPr/>
+        </p:nvPicPr>
+        <p:blipFill>
+          <a:blip r:embed="rId6">
+            <a:duotone>
+              <a:schemeClr val="bg2">
+                <a:shade val="45000"/>
+                <a:satMod val="135000"/>
+              </a:schemeClr>
+              <a:prstClr val="white"/>
+            </a:duotone>
+            <a:extLst>
+              <a:ext uri="{BEBA8EAE-BF5A-486C-A8C5-ECC9F3942E4B}">
+                <a14:imgProps xmlns:a14="http://schemas.microsoft.com/office/drawing/2010/main">
+                  <a14:imgLayer r:embed="rId7">
+                    <a14:imgEffect>
+                      <a14:saturation sat="0"/>
+                    </a14:imgEffect>
+                  </a14:imgLayer>
+                </a14:imgProps>
+              </a:ext>
+            </a:extLst>
+          </a:blip>
+          <a:stretch>
+            <a:fillRect/>
+          </a:stretch>
+        </p:blipFill>
+        <p:spPr>
+          <a:xfrm>
+            <a:off x="1899605" y="4429116"/>
+            <a:ext cx="845356" cy="612452"/>
+          </a:xfrm>
+          <a:prstGeom prst="rect">
+            <a:avLst/>
+          </a:prstGeom>
+        </p:spPr>
+      </p:pic>
+      <p:sp>
+        <p:nvSpPr>
+          <p:cNvPr id="13" name="직사각형 256">
+            <a:extLst>
+              <a:ext uri="{FF2B5EF4-FFF2-40B4-BE49-F238E27FC236}">
+                <a16:creationId xmlns:a16="http://schemas.microsoft.com/office/drawing/2014/main" id="{CECCB4B3-59C2-E526-0A17-28B47DCF6150}"/>
+              </a:ext>
+            </a:extLst>
+          </p:cNvPr>
+          <p:cNvSpPr/>
+          <p:nvPr/>
+        </p:nvSpPr>
+        <p:spPr>
+          <a:xfrm>
+            <a:off x="1922344" y="4023272"/>
+            <a:ext cx="726161" cy="151388"/>
+          </a:xfrm>
+          <a:prstGeom prst="rect">
+            <a:avLst/>
+          </a:prstGeom>
+        </p:spPr>
+        <p:txBody>
+          <a:bodyPr wrap="none" lIns="0" tIns="0" rIns="0" bIns="0">
+            <a:spAutoFit/>
+          </a:bodyPr>
+          <a:lstStyle/>
+          <a:p>
+            <a:pPr>
+              <a:lnSpc>
+                <a:spcPct val="80000"/>
+              </a:lnSpc>
+            </a:pPr>
+            <a:r>
+              <a:rPr lang="en-US" altLang="ko-KR" sz="1200" dirty="0">
+                <a:solidFill>
+                  <a:prstClr val="black"/>
+                </a:solidFill>
+                <a:latin typeface="Calibri" panose="020F0502020204030204" pitchFamily="34" charset="0"/>
+              </a:rPr>
+              <a:t>Mobile App</a:t>
+            </a:r>
+            <a:endParaRPr lang="ko-KR" altLang="en-US" sz="1200" dirty="0">
+              <a:solidFill>
+                <a:prstClr val="black"/>
+              </a:solidFill>
+              <a:latin typeface="Calibri" panose="020F0502020204030204" pitchFamily="34" charset="0"/>
+            </a:endParaRPr>
+          </a:p>
+        </p:txBody>
+      </p:sp>
+      <p:sp>
+        <p:nvSpPr>
+          <p:cNvPr id="14" name="직사각형 256">
+            <a:extLst>
+              <a:ext uri="{FF2B5EF4-FFF2-40B4-BE49-F238E27FC236}">
+                <a16:creationId xmlns:a16="http://schemas.microsoft.com/office/drawing/2014/main" id="{938489AC-B855-9952-40E2-B8E2787A42D1}"/>
+              </a:ext>
+            </a:extLst>
+          </p:cNvPr>
+          <p:cNvSpPr/>
+          <p:nvPr/>
+        </p:nvSpPr>
+        <p:spPr>
+          <a:xfrm>
+            <a:off x="2048805" y="5100423"/>
+            <a:ext cx="573042" cy="151388"/>
+          </a:xfrm>
+          <a:prstGeom prst="rect">
+            <a:avLst/>
+          </a:prstGeom>
+        </p:spPr>
+        <p:txBody>
+          <a:bodyPr wrap="none" lIns="0" tIns="0" rIns="0" bIns="0">
+            <a:spAutoFit/>
+          </a:bodyPr>
+          <a:lstStyle/>
+          <a:p>
+            <a:pPr>
+              <a:lnSpc>
+                <a:spcPct val="80000"/>
+              </a:lnSpc>
+            </a:pPr>
+            <a:r>
+              <a:rPr lang="en-US" altLang="ko-KR" sz="1200" dirty="0">
+                <a:solidFill>
+                  <a:prstClr val="black"/>
+                </a:solidFill>
+                <a:latin typeface="Calibri" panose="020F0502020204030204" pitchFamily="34" charset="0"/>
+              </a:rPr>
+              <a:t>Web App</a:t>
+            </a:r>
+            <a:endParaRPr lang="ko-KR" altLang="en-US" sz="1200" dirty="0">
+              <a:solidFill>
+                <a:prstClr val="black"/>
+              </a:solidFill>
+              <a:latin typeface="Calibri" panose="020F0502020204030204" pitchFamily="34" charset="0"/>
+            </a:endParaRPr>
+          </a:p>
+        </p:txBody>
+      </p:sp>
+      <p:sp>
+        <p:nvSpPr>
+          <p:cNvPr id="15" name="직사각형 363">
+            <a:extLst>
+              <a:ext uri="{FF2B5EF4-FFF2-40B4-BE49-F238E27FC236}">
+                <a16:creationId xmlns:a16="http://schemas.microsoft.com/office/drawing/2014/main" id="{6137936E-2B56-2DAB-1CB6-E0A5F9CA063F}"/>
+              </a:ext>
+            </a:extLst>
+          </p:cNvPr>
+          <p:cNvSpPr/>
+          <p:nvPr/>
+        </p:nvSpPr>
+        <p:spPr>
+          <a:xfrm rot="16200000">
+            <a:off x="7804184" y="2713550"/>
+            <a:ext cx="4002708" cy="1900956"/>
+          </a:xfrm>
+          <a:prstGeom prst="rect">
+            <a:avLst/>
+          </a:prstGeom>
+          <a:noFill/>
+          <a:ln w="3175" cap="flat" cmpd="sng" algn="ctr">
+            <a:solidFill>
+              <a:schemeClr val="tx1">
+                <a:lumMod val="50000"/>
+                <a:lumOff val="50000"/>
+              </a:schemeClr>
+            </a:solidFill>
+            <a:prstDash val="dash"/>
+            <a:miter lim="800000"/>
+          </a:ln>
+          <a:effectLst/>
+        </p:spPr>
+        <p:txBody>
+          <a:bodyPr vert="vert" lIns="0" tIns="0" rIns="0" bIns="0" rtlCol="0" anchor="ctr"/>
+          <a:lstStyle/>
+          <a:p>
+            <a:pPr algn="ctr">
+              <a:lnSpc>
+                <a:spcPct val="80000"/>
+              </a:lnSpc>
+            </a:pPr>
+            <a:endParaRPr lang="ko-KR" altLang="en-US" sz="900" kern="0" dirty="0">
+              <a:solidFill>
+                <a:schemeClr val="bg1">
+                  <a:lumMod val="65000"/>
+                </a:schemeClr>
+              </a:solidFill>
+              <a:latin typeface="Calibri" panose="020F0502020204030204" pitchFamily="34" charset="0"/>
+              <a:ea typeface="맑은 고딕"/>
+            </a:endParaRPr>
+          </a:p>
+        </p:txBody>
+      </p:sp>
+      <p:sp>
+        <p:nvSpPr>
+          <p:cNvPr id="16" name="직사각형 363">
+            <a:extLst>
+              <a:ext uri="{FF2B5EF4-FFF2-40B4-BE49-F238E27FC236}">
+                <a16:creationId xmlns:a16="http://schemas.microsoft.com/office/drawing/2014/main" id="{C0BB402A-01B6-5C88-57D6-27674EF2066C}"/>
+              </a:ext>
+            </a:extLst>
+          </p:cNvPr>
+          <p:cNvSpPr/>
+          <p:nvPr/>
+        </p:nvSpPr>
+        <p:spPr>
+          <a:xfrm>
+            <a:off x="1550669" y="1389054"/>
+            <a:ext cx="1444279" cy="195599"/>
+          </a:xfrm>
+          <a:prstGeom prst="rect">
+            <a:avLst/>
+          </a:prstGeom>
+          <a:solidFill>
+            <a:schemeClr val="bg1">
+              <a:lumMod val="95000"/>
+            </a:schemeClr>
+          </a:solidFill>
+          <a:ln w="3175" cap="flat" cmpd="sng" algn="ctr">
+            <a:noFill/>
+            <a:prstDash val="solid"/>
+            <a:miter lim="800000"/>
+          </a:ln>
+          <a:effectLst/>
+        </p:spPr>
+        <p:txBody>
+          <a:bodyPr rtlCol="0" anchor="ctr"/>
+          <a:lstStyle/>
+          <a:p>
+            <a:pPr marL="0" marR="0" lvl="0" indent="0" algn="ctr" defTabSz="914400" eaLnBrk="1" fontAlgn="auto" latinLnBrk="0" hangingPunct="1">
+              <a:lnSpc>
+                <a:spcPct val="80000"/>
+              </a:lnSpc>
+              <a:spcBef>
+                <a:spcPts val="0"/>
+              </a:spcBef>
+              <a:spcAft>
+                <a:spcPts val="0"/>
+              </a:spcAft>
+              <a:buClrTx/>
+              <a:buSzTx/>
+              <a:buFontTx/>
+              <a:buNone/>
+              <a:tabLst/>
+              <a:defRPr/>
+            </a:pPr>
+            <a:r>
+              <a:rPr kumimoji="0" lang="en-US" altLang="ko-KR" sz="1000" b="0" i="0" u="none" strike="noStrike" kern="0" cap="none" spc="0" normalizeH="0" baseline="0" noProof="0" dirty="0">
+                <a:ln>
+                  <a:noFill/>
+                </a:ln>
+                <a:solidFill>
+                  <a:schemeClr val="tx1">
+                    <a:lumMod val="50000"/>
+                    <a:lumOff val="50000"/>
+                  </a:schemeClr>
+                </a:solidFill>
+                <a:effectLst/>
+                <a:uLnTx/>
+                <a:uFillTx/>
+                <a:latin typeface="Calibri" panose="020F0502020204030204" pitchFamily="34" charset="0"/>
+                <a:ea typeface="맑은 고딕"/>
+              </a:rPr>
+              <a:t>Frontend App</a:t>
+            </a:r>
+            <a:endParaRPr kumimoji="0" lang="ko-KR" altLang="en-US" sz="1000" b="0" i="0" u="none" strike="noStrike" kern="0" cap="none" spc="0" normalizeH="0" baseline="0" noProof="0" dirty="0">
+              <a:ln>
+                <a:noFill/>
+              </a:ln>
+              <a:solidFill>
+                <a:schemeClr val="tx1">
+                  <a:lumMod val="50000"/>
+                  <a:lumOff val="50000"/>
+                </a:schemeClr>
+              </a:solidFill>
+              <a:effectLst/>
+              <a:uLnTx/>
+              <a:uFillTx/>
+              <a:latin typeface="Calibri" panose="020F0502020204030204" pitchFamily="34" charset="0"/>
+              <a:ea typeface="맑은 고딕"/>
+            </a:endParaRPr>
+          </a:p>
+        </p:txBody>
+      </p:sp>
+      <p:sp>
+        <p:nvSpPr>
+          <p:cNvPr id="17" name="직사각형 363">
+            <a:extLst>
+              <a:ext uri="{FF2B5EF4-FFF2-40B4-BE49-F238E27FC236}">
+                <a16:creationId xmlns:a16="http://schemas.microsoft.com/office/drawing/2014/main" id="{F1798BEC-008D-B322-4D2D-9FC1FBC59CCF}"/>
+              </a:ext>
+            </a:extLst>
+          </p:cNvPr>
+          <p:cNvSpPr/>
+          <p:nvPr/>
+        </p:nvSpPr>
+        <p:spPr>
+          <a:xfrm>
+            <a:off x="8857301" y="1430924"/>
+            <a:ext cx="1898715" cy="195599"/>
+          </a:xfrm>
+          <a:prstGeom prst="rect">
+            <a:avLst/>
+          </a:prstGeom>
+          <a:solidFill>
+            <a:schemeClr val="bg1">
+              <a:lumMod val="95000"/>
+            </a:schemeClr>
+          </a:solidFill>
+          <a:ln w="3175" cap="flat" cmpd="sng" algn="ctr">
+            <a:noFill/>
+            <a:prstDash val="solid"/>
+            <a:miter lim="800000"/>
+          </a:ln>
+          <a:effectLst/>
+        </p:spPr>
+        <p:txBody>
+          <a:bodyPr rtlCol="0" anchor="ctr"/>
+          <a:lstStyle/>
+          <a:p>
+            <a:pPr marL="0" marR="0" lvl="0" indent="0" algn="ctr" defTabSz="914400" eaLnBrk="1" fontAlgn="auto" latinLnBrk="0" hangingPunct="1">
+              <a:lnSpc>
+                <a:spcPct val="80000"/>
+              </a:lnSpc>
+              <a:spcBef>
+                <a:spcPts val="0"/>
+              </a:spcBef>
+              <a:spcAft>
+                <a:spcPts val="0"/>
+              </a:spcAft>
+              <a:buClrTx/>
+              <a:buSzTx/>
+              <a:buFontTx/>
+              <a:buNone/>
+              <a:tabLst/>
+              <a:defRPr/>
+            </a:pPr>
+            <a:r>
+              <a:rPr lang="en-US" altLang="ko-KR" sz="1000" kern="0" dirty="0">
+                <a:solidFill>
+                  <a:schemeClr val="tx1">
+                    <a:lumMod val="50000"/>
+                    <a:lumOff val="50000"/>
+                  </a:schemeClr>
+                </a:solidFill>
+                <a:latin typeface="Calibri" panose="020F0502020204030204" pitchFamily="34" charset="0"/>
+                <a:ea typeface="맑은 고딕"/>
+              </a:rPr>
+              <a:t>3</a:t>
+            </a:r>
+            <a:r>
+              <a:rPr lang="en-US" altLang="ko-KR" sz="1000" kern="0" baseline="30000" dirty="0">
+                <a:solidFill>
+                  <a:schemeClr val="tx1">
+                    <a:lumMod val="50000"/>
+                    <a:lumOff val="50000"/>
+                  </a:schemeClr>
+                </a:solidFill>
+                <a:latin typeface="Calibri" panose="020F0502020204030204" pitchFamily="34" charset="0"/>
+                <a:ea typeface="맑은 고딕"/>
+              </a:rPr>
+              <a:t>rd</a:t>
+            </a:r>
+            <a:r>
+              <a:rPr lang="en-US" altLang="ko-KR" sz="1000" kern="0" dirty="0">
+                <a:solidFill>
+                  <a:schemeClr val="tx1">
+                    <a:lumMod val="50000"/>
+                    <a:lumOff val="50000"/>
+                  </a:schemeClr>
+                </a:solidFill>
+                <a:latin typeface="Calibri" panose="020F0502020204030204" pitchFamily="34" charset="0"/>
+                <a:ea typeface="맑은 고딕"/>
+              </a:rPr>
+              <a:t> Party </a:t>
+            </a:r>
+            <a:r>
+              <a:rPr kumimoji="0" lang="en-US" altLang="ko-KR" sz="1000" b="0" i="0" u="none" strike="noStrike" kern="0" cap="none" spc="0" normalizeH="0" baseline="0" noProof="0" dirty="0">
+                <a:ln>
+                  <a:noFill/>
+                </a:ln>
+                <a:solidFill>
+                  <a:schemeClr val="tx1">
+                    <a:lumMod val="50000"/>
+                    <a:lumOff val="50000"/>
+                  </a:schemeClr>
+                </a:solidFill>
+                <a:effectLst/>
+                <a:uLnTx/>
+                <a:uFillTx/>
+                <a:latin typeface="Calibri" panose="020F0502020204030204" pitchFamily="34" charset="0"/>
+                <a:ea typeface="맑은 고딕"/>
+              </a:rPr>
+              <a:t>Payment Gateway</a:t>
+            </a:r>
+            <a:endParaRPr kumimoji="0" lang="ko-KR" altLang="en-US" sz="1000" b="0" i="0" u="none" strike="noStrike" kern="0" cap="none" spc="0" normalizeH="0" baseline="0" noProof="0" dirty="0">
+              <a:ln>
+                <a:noFill/>
+              </a:ln>
+              <a:solidFill>
+                <a:schemeClr val="tx1">
+                  <a:lumMod val="50000"/>
+                  <a:lumOff val="50000"/>
+                </a:schemeClr>
+              </a:solidFill>
+              <a:effectLst/>
+              <a:uLnTx/>
+              <a:uFillTx/>
+              <a:latin typeface="Calibri" panose="020F0502020204030204" pitchFamily="34" charset="0"/>
+              <a:ea typeface="맑은 고딕"/>
+            </a:endParaRPr>
+          </a:p>
+        </p:txBody>
+      </p:sp>
+      <p:sp>
+        <p:nvSpPr>
+          <p:cNvPr id="18" name="직사각형 363">
+            <a:extLst>
+              <a:ext uri="{FF2B5EF4-FFF2-40B4-BE49-F238E27FC236}">
+                <a16:creationId xmlns:a16="http://schemas.microsoft.com/office/drawing/2014/main" id="{5314B0D8-9181-EF45-53E4-46840EDE321B}"/>
+              </a:ext>
+            </a:extLst>
+          </p:cNvPr>
+          <p:cNvSpPr/>
+          <p:nvPr/>
+        </p:nvSpPr>
+        <p:spPr>
+          <a:xfrm rot="16200000">
+            <a:off x="2366294" y="2626802"/>
+            <a:ext cx="4002707" cy="2047529"/>
+          </a:xfrm>
+          <a:prstGeom prst="rect">
+            <a:avLst/>
+          </a:prstGeom>
+          <a:noFill/>
+          <a:ln w="3175" cap="flat" cmpd="sng" algn="ctr">
+            <a:solidFill>
+              <a:schemeClr val="tx1">
+                <a:lumMod val="50000"/>
+                <a:lumOff val="50000"/>
+              </a:schemeClr>
+            </a:solidFill>
+            <a:prstDash val="dash"/>
+            <a:miter lim="800000"/>
+          </a:ln>
+          <a:effectLst/>
+        </p:spPr>
+        <p:txBody>
+          <a:bodyPr vert="vert" lIns="0" tIns="0" rIns="0" bIns="0" rtlCol="0" anchor="ctr"/>
+          <a:lstStyle/>
+          <a:p>
+            <a:pPr algn="ctr">
+              <a:lnSpc>
+                <a:spcPct val="80000"/>
+              </a:lnSpc>
+            </a:pPr>
+            <a:endParaRPr lang="ko-KR" altLang="en-US" sz="900" kern="0" dirty="0">
+              <a:solidFill>
+                <a:schemeClr val="bg1">
+                  <a:lumMod val="65000"/>
+                </a:schemeClr>
+              </a:solidFill>
+              <a:latin typeface="Calibri" panose="020F0502020204030204" pitchFamily="34" charset="0"/>
+              <a:ea typeface="맑은 고딕"/>
+            </a:endParaRPr>
+          </a:p>
+        </p:txBody>
+      </p:sp>
+      <p:sp>
+        <p:nvSpPr>
+          <p:cNvPr id="19" name="직사각형 363">
+            <a:extLst>
+              <a:ext uri="{FF2B5EF4-FFF2-40B4-BE49-F238E27FC236}">
+                <a16:creationId xmlns:a16="http://schemas.microsoft.com/office/drawing/2014/main" id="{8789FCA5-5F1D-FE6D-09A1-066453C07C9E}"/>
+              </a:ext>
+            </a:extLst>
+          </p:cNvPr>
+          <p:cNvSpPr/>
+          <p:nvPr/>
+        </p:nvSpPr>
+        <p:spPr>
+          <a:xfrm rot="16200000">
+            <a:off x="5124984" y="2235811"/>
+            <a:ext cx="4002709" cy="2856433"/>
+          </a:xfrm>
+          <a:prstGeom prst="rect">
+            <a:avLst/>
+          </a:prstGeom>
+          <a:noFill/>
+          <a:ln w="3175" cap="flat" cmpd="sng" algn="ctr">
+            <a:solidFill>
+              <a:schemeClr val="tx1">
+                <a:lumMod val="50000"/>
+                <a:lumOff val="50000"/>
+              </a:schemeClr>
+            </a:solidFill>
+            <a:prstDash val="dash"/>
+            <a:miter lim="800000"/>
+          </a:ln>
+          <a:effectLst/>
+        </p:spPr>
+        <p:txBody>
+          <a:bodyPr vert="vert" lIns="0" tIns="0" rIns="0" bIns="0" rtlCol="0" anchor="ctr"/>
+          <a:lstStyle/>
+          <a:p>
+            <a:pPr algn="ctr">
+              <a:lnSpc>
+                <a:spcPct val="80000"/>
+              </a:lnSpc>
+            </a:pPr>
+            <a:endParaRPr lang="ko-KR" altLang="en-US" sz="900" kern="0" dirty="0">
+              <a:solidFill>
+                <a:schemeClr val="bg1">
+                  <a:lumMod val="65000"/>
+                </a:schemeClr>
+              </a:solidFill>
+              <a:latin typeface="Calibri" panose="020F0502020204030204" pitchFamily="34" charset="0"/>
+              <a:ea typeface="맑은 고딕"/>
+            </a:endParaRPr>
+          </a:p>
+        </p:txBody>
+      </p:sp>
+      <p:sp>
+        <p:nvSpPr>
+          <p:cNvPr id="20" name="직사각형 363">
+            <a:extLst>
+              <a:ext uri="{FF2B5EF4-FFF2-40B4-BE49-F238E27FC236}">
+                <a16:creationId xmlns:a16="http://schemas.microsoft.com/office/drawing/2014/main" id="{994877EA-9B24-3751-1CCF-D9128003CC7E}"/>
+              </a:ext>
+            </a:extLst>
+          </p:cNvPr>
+          <p:cNvSpPr/>
+          <p:nvPr/>
+        </p:nvSpPr>
+        <p:spPr>
+          <a:xfrm>
+            <a:off x="3343883" y="1401342"/>
+            <a:ext cx="2059649" cy="225181"/>
+          </a:xfrm>
+          <a:prstGeom prst="rect">
+            <a:avLst/>
+          </a:prstGeom>
+          <a:solidFill>
+            <a:schemeClr val="accent6">
+              <a:lumMod val="20000"/>
+              <a:lumOff val="80000"/>
+            </a:schemeClr>
+          </a:solidFill>
+          <a:ln w="3175" cap="flat" cmpd="sng" algn="ctr">
+            <a:noFill/>
+            <a:prstDash val="solid"/>
+            <a:miter lim="800000"/>
+          </a:ln>
+          <a:effectLst/>
+        </p:spPr>
+        <p:txBody>
+          <a:bodyPr lIns="0" rIns="0" rtlCol="0" anchor="ctr"/>
+          <a:lstStyle/>
+          <a:p>
+            <a:pPr marL="0" marR="0" lvl="0" indent="0" algn="ctr" defTabSz="914400" eaLnBrk="1" fontAlgn="auto" latinLnBrk="0" hangingPunct="1">
+              <a:lnSpc>
+                <a:spcPct val="80000"/>
+              </a:lnSpc>
+              <a:spcBef>
+                <a:spcPts val="0"/>
+              </a:spcBef>
+              <a:spcAft>
+                <a:spcPts val="0"/>
+              </a:spcAft>
+              <a:buClrTx/>
+              <a:buSzTx/>
+              <a:buFontTx/>
+              <a:buNone/>
+              <a:tabLst/>
+              <a:defRPr/>
+            </a:pPr>
+            <a:r>
+              <a:rPr kumimoji="0" lang="en-US" altLang="ko-KR" sz="1000" b="0" i="0" u="none" strike="noStrike" kern="0" cap="none" spc="0" normalizeH="0" baseline="0" noProof="0" dirty="0">
+                <a:ln>
+                  <a:noFill/>
+                </a:ln>
+                <a:solidFill>
+                  <a:prstClr val="black"/>
+                </a:solidFill>
+                <a:effectLst/>
+                <a:uLnTx/>
+                <a:uFillTx/>
+                <a:latin typeface="Calibri" panose="020F0502020204030204" pitchFamily="34" charset="0"/>
+                <a:ea typeface="맑은 고딕"/>
+              </a:rPr>
+              <a:t>NGINX Serverless Gateway Core</a:t>
+            </a:r>
+            <a:endParaRPr kumimoji="0" lang="ko-KR" altLang="en-US" sz="1000" b="0" i="0" u="none" strike="noStrike" kern="0" cap="none" spc="0" normalizeH="0" baseline="0" noProof="0" dirty="0">
+              <a:ln>
+                <a:noFill/>
+              </a:ln>
+              <a:solidFill>
+                <a:schemeClr val="tx1">
+                  <a:lumMod val="50000"/>
+                  <a:lumOff val="50000"/>
+                </a:schemeClr>
+              </a:solidFill>
+              <a:effectLst/>
+              <a:uLnTx/>
+              <a:uFillTx/>
+              <a:latin typeface="Calibri" panose="020F0502020204030204" pitchFamily="34" charset="0"/>
+              <a:ea typeface="맑은 고딕"/>
+            </a:endParaRPr>
+          </a:p>
+        </p:txBody>
+      </p:sp>
+      <p:sp>
+        <p:nvSpPr>
+          <p:cNvPr id="21" name="직사각형 363">
+            <a:extLst>
+              <a:ext uri="{FF2B5EF4-FFF2-40B4-BE49-F238E27FC236}">
+                <a16:creationId xmlns:a16="http://schemas.microsoft.com/office/drawing/2014/main" id="{A3A37FE4-E12B-86BF-83D2-A4B34129097B}"/>
+              </a:ext>
+            </a:extLst>
+          </p:cNvPr>
+          <p:cNvSpPr/>
+          <p:nvPr/>
+        </p:nvSpPr>
+        <p:spPr>
+          <a:xfrm>
+            <a:off x="5694158" y="1411885"/>
+            <a:ext cx="2856433" cy="225181"/>
+          </a:xfrm>
+          <a:prstGeom prst="rect">
+            <a:avLst/>
+          </a:prstGeom>
+          <a:solidFill>
+            <a:schemeClr val="accent6">
+              <a:lumMod val="20000"/>
+              <a:lumOff val="80000"/>
+            </a:schemeClr>
+          </a:solidFill>
+          <a:ln w="3175" cap="flat" cmpd="sng" algn="ctr">
+            <a:noFill/>
+            <a:prstDash val="solid"/>
+            <a:miter lim="800000"/>
+          </a:ln>
+          <a:effectLst/>
+        </p:spPr>
+        <p:txBody>
+          <a:bodyPr lIns="0" rIns="0" rtlCol="0" anchor="ctr"/>
+          <a:lstStyle/>
+          <a:p>
+            <a:pPr marL="0" marR="0" lvl="0" indent="0" algn="ctr" defTabSz="914400" eaLnBrk="1" fontAlgn="auto" latinLnBrk="0" hangingPunct="1">
+              <a:lnSpc>
+                <a:spcPct val="80000"/>
+              </a:lnSpc>
+              <a:spcBef>
+                <a:spcPts val="0"/>
+              </a:spcBef>
+              <a:spcAft>
+                <a:spcPts val="0"/>
+              </a:spcAft>
+              <a:buClrTx/>
+              <a:buSzTx/>
+              <a:buFontTx/>
+              <a:buNone/>
+              <a:tabLst/>
+              <a:defRPr/>
+            </a:pPr>
+            <a:r>
+              <a:rPr kumimoji="0" lang="en-US" altLang="ko-KR" sz="1000" b="0" i="0" u="none" strike="noStrike" kern="0" cap="none" spc="0" normalizeH="0" baseline="0" noProof="0" dirty="0">
+                <a:ln>
+                  <a:noFill/>
+                </a:ln>
+                <a:solidFill>
+                  <a:prstClr val="black"/>
+                </a:solidFill>
+                <a:effectLst/>
+                <a:uLnTx/>
+                <a:uFillTx/>
+                <a:latin typeface="Calibri" panose="020F0502020204030204" pitchFamily="34" charset="0"/>
+                <a:ea typeface="맑은 고딕"/>
+              </a:rPr>
+              <a:t>Cloud Provider: Serverless Service Codes</a:t>
+            </a:r>
+            <a:endParaRPr kumimoji="0" lang="ko-KR" altLang="en-US" sz="1000" b="0" i="0" u="none" strike="noStrike" kern="0" cap="none" spc="0" normalizeH="0" baseline="0" noProof="0" dirty="0">
+              <a:ln>
+                <a:noFill/>
+              </a:ln>
+              <a:solidFill>
+                <a:schemeClr val="tx1">
+                  <a:lumMod val="50000"/>
+                  <a:lumOff val="50000"/>
+                </a:schemeClr>
+              </a:solidFill>
+              <a:effectLst/>
+              <a:uLnTx/>
+              <a:uFillTx/>
+              <a:latin typeface="Calibri" panose="020F0502020204030204" pitchFamily="34" charset="0"/>
+              <a:ea typeface="맑은 고딕"/>
+            </a:endParaRPr>
+          </a:p>
+        </p:txBody>
+      </p:sp>
+      <p:cxnSp>
+        <p:nvCxnSpPr>
+          <p:cNvPr id="22" name="Straight Arrow Connector 21">
+            <a:extLst>
+              <a:ext uri="{FF2B5EF4-FFF2-40B4-BE49-F238E27FC236}">
+                <a16:creationId xmlns:a16="http://schemas.microsoft.com/office/drawing/2014/main" id="{980F2C7C-3499-EB06-5279-0A51B373E0BE}"/>
+              </a:ext>
+            </a:extLst>
+          </p:cNvPr>
+          <p:cNvCxnSpPr>
+            <a:cxnSpLocks/>
+            <a:stCxn id="10" idx="2"/>
+            <a:endCxn id="18" idx="0"/>
+          </p:cNvCxnSpPr>
+          <p:nvPr/>
+        </p:nvCxnSpPr>
+        <p:spPr>
+          <a:xfrm>
+            <a:off x="2994949" y="3644865"/>
+            <a:ext cx="348934" cy="5701"/>
+          </a:xfrm>
+          <a:prstGeom prst="straightConnector1">
+            <a:avLst/>
+          </a:prstGeom>
+          <a:ln>
+            <a:solidFill>
+              <a:schemeClr val="tx1">
+                <a:lumMod val="50000"/>
+                <a:lumOff val="50000"/>
+              </a:schemeClr>
+            </a:solidFill>
+            <a:prstDash val="dash"/>
+            <a:headEnd type="triangle" w="sm" len="sm"/>
+            <a:tailEnd type="triangle" w="sm" len="sm"/>
+          </a:ln>
+        </p:spPr>
+        <p:style>
+          <a:lnRef idx="1">
+            <a:schemeClr val="accent1"/>
+          </a:lnRef>
+          <a:fillRef idx="0">
+            <a:schemeClr val="accent1"/>
+          </a:fillRef>
+          <a:effectRef idx="0">
+            <a:schemeClr val="accent1"/>
+          </a:effectRef>
+          <a:fontRef idx="minor">
+            <a:schemeClr val="tx1"/>
+          </a:fontRef>
+        </p:style>
+      </p:cxnSp>
+      <p:pic>
+        <p:nvPicPr>
+          <p:cNvPr id="23" name="Picture 4" descr="Image result for AWS Lambda">
+            <a:extLst>
+              <a:ext uri="{FF2B5EF4-FFF2-40B4-BE49-F238E27FC236}">
+                <a16:creationId xmlns:a16="http://schemas.microsoft.com/office/drawing/2014/main" id="{3FBC4463-3BA1-796F-6BA7-004EF6922E74}"/>
+              </a:ext>
+            </a:extLst>
+          </p:cNvPr>
+          <p:cNvPicPr>
+            <a:picLocks noChangeAspect="1" noChangeArrowheads="1"/>
+          </p:cNvPicPr>
+          <p:nvPr/>
+        </p:nvPicPr>
+        <p:blipFill>
+          <a:blip r:embed="rId3">
+            <a:extLst>
+              <a:ext uri="{28A0092B-C50C-407E-A947-70E740481C1C}">
+                <a14:useLocalDpi xmlns:a14="http://schemas.microsoft.com/office/drawing/2010/main" val="0"/>
+              </a:ext>
+            </a:extLst>
+          </a:blip>
+          <a:srcRect/>
+          <a:stretch>
+            <a:fillRect/>
+          </a:stretch>
+        </p:blipFill>
+        <p:spPr bwMode="auto">
+          <a:xfrm>
+            <a:off x="4475745" y="2299799"/>
+            <a:ext cx="222833" cy="222833"/>
+          </a:xfrm>
+          <a:prstGeom prst="rect">
+            <a:avLst/>
+          </a:prstGeom>
+          <a:noFill/>
+          <a:extLst>
+            <a:ext uri="{909E8E84-426E-40DD-AFC4-6F175D3DCCD1}">
+              <a14:hiddenFill xmlns:a14="http://schemas.microsoft.com/office/drawing/2010/main">
+                <a:solidFill>
+                  <a:srgbClr val="FFFFFF"/>
+                </a:solidFill>
+              </a14:hiddenFill>
+            </a:ext>
+          </a:extLst>
+        </p:spPr>
+      </p:pic>
+      <p:pic>
+        <p:nvPicPr>
+          <p:cNvPr id="24" name="Picture 10" descr="Azure Functions (@AzureFunctions) / Twitter">
+            <a:extLst>
+              <a:ext uri="{FF2B5EF4-FFF2-40B4-BE49-F238E27FC236}">
+                <a16:creationId xmlns:a16="http://schemas.microsoft.com/office/drawing/2014/main" id="{F8CC4CB3-3E86-AC2F-8057-4DD06CCAC38B}"/>
+              </a:ext>
+            </a:extLst>
+          </p:cNvPr>
+          <p:cNvPicPr>
+            <a:picLocks noChangeAspect="1" noChangeArrowheads="1"/>
+          </p:cNvPicPr>
+          <p:nvPr/>
+        </p:nvPicPr>
+        <p:blipFill>
+          <a:blip r:embed="rId8">
+            <a:extLst>
+              <a:ext uri="{28A0092B-C50C-407E-A947-70E740481C1C}">
+                <a14:useLocalDpi xmlns:a14="http://schemas.microsoft.com/office/drawing/2010/main" val="0"/>
+              </a:ext>
+            </a:extLst>
+          </a:blip>
+          <a:srcRect/>
+          <a:stretch>
+            <a:fillRect/>
+          </a:stretch>
+        </p:blipFill>
+        <p:spPr bwMode="auto">
+          <a:xfrm>
+            <a:off x="6159543" y="3295382"/>
+            <a:ext cx="556302" cy="556302"/>
+          </a:xfrm>
+          <a:prstGeom prst="rect">
+            <a:avLst/>
+          </a:prstGeom>
+          <a:noFill/>
+          <a:extLst>
+            <a:ext uri="{909E8E84-426E-40DD-AFC4-6F175D3DCCD1}">
+              <a14:hiddenFill xmlns:a14="http://schemas.microsoft.com/office/drawing/2010/main">
+                <a:solidFill>
+                  <a:srgbClr val="FFFFFF"/>
+                </a:solidFill>
+              </a14:hiddenFill>
+            </a:ext>
+          </a:extLst>
+        </p:spPr>
+      </p:pic>
+      <p:cxnSp>
+        <p:nvCxnSpPr>
+          <p:cNvPr id="25" name="Straight Arrow Connector 24">
+            <a:extLst>
+              <a:ext uri="{FF2B5EF4-FFF2-40B4-BE49-F238E27FC236}">
+                <a16:creationId xmlns:a16="http://schemas.microsoft.com/office/drawing/2014/main" id="{5F13BD3B-9DCF-5556-67DA-EF1205C6323E}"/>
+              </a:ext>
+            </a:extLst>
+          </p:cNvPr>
+          <p:cNvCxnSpPr>
+            <a:cxnSpLocks/>
+            <a:stCxn id="18" idx="2"/>
+            <a:endCxn id="19" idx="0"/>
+          </p:cNvCxnSpPr>
+          <p:nvPr/>
+        </p:nvCxnSpPr>
+        <p:spPr>
+          <a:xfrm>
+            <a:off x="5391412" y="3650566"/>
+            <a:ext cx="306710" cy="13461"/>
+          </a:xfrm>
+          <a:prstGeom prst="straightConnector1">
+            <a:avLst/>
+          </a:prstGeom>
+          <a:ln>
+            <a:solidFill>
+              <a:schemeClr val="tx1">
+                <a:lumMod val="50000"/>
+                <a:lumOff val="50000"/>
+              </a:schemeClr>
+            </a:solidFill>
+            <a:prstDash val="dash"/>
+            <a:headEnd type="triangle" w="sm" len="sm"/>
+            <a:tailEnd type="triangle" w="sm" len="sm"/>
+          </a:ln>
+        </p:spPr>
+        <p:style>
+          <a:lnRef idx="1">
+            <a:schemeClr val="accent1"/>
+          </a:lnRef>
+          <a:fillRef idx="0">
+            <a:schemeClr val="accent1"/>
+          </a:fillRef>
+          <a:effectRef idx="0">
+            <a:schemeClr val="accent1"/>
+          </a:effectRef>
+          <a:fontRef idx="minor">
+            <a:schemeClr val="tx1"/>
+          </a:fontRef>
+        </p:style>
+      </p:cxnSp>
+      <p:pic>
+        <p:nvPicPr>
+          <p:cNvPr id="26" name="Picture 2" descr="Image result for nginx">
+            <a:extLst>
+              <a:ext uri="{FF2B5EF4-FFF2-40B4-BE49-F238E27FC236}">
+                <a16:creationId xmlns:a16="http://schemas.microsoft.com/office/drawing/2014/main" id="{5B62C1C6-F05F-07A4-1931-640B6275431F}"/>
+              </a:ext>
+            </a:extLst>
+          </p:cNvPr>
+          <p:cNvPicPr>
+            <a:picLocks noChangeAspect="1" noChangeArrowheads="1"/>
+          </p:cNvPicPr>
+          <p:nvPr/>
+        </p:nvPicPr>
+        <p:blipFill>
+          <a:blip r:embed="rId2">
+            <a:extLst>
+              <a:ext uri="{28A0092B-C50C-407E-A947-70E740481C1C}">
+                <a14:useLocalDpi xmlns:a14="http://schemas.microsoft.com/office/drawing/2010/main" val="0"/>
+              </a:ext>
+            </a:extLst>
+          </a:blip>
+          <a:srcRect/>
+          <a:stretch>
+            <a:fillRect/>
+          </a:stretch>
+        </p:blipFill>
+        <p:spPr bwMode="auto">
+          <a:xfrm>
+            <a:off x="4073508" y="3279415"/>
+            <a:ext cx="512661" cy="595968"/>
+          </a:xfrm>
+          <a:prstGeom prst="rect">
+            <a:avLst/>
+          </a:prstGeom>
+          <a:noFill/>
+          <a:extLst>
+            <a:ext uri="{909E8E84-426E-40DD-AFC4-6F175D3DCCD1}">
+              <a14:hiddenFill xmlns:a14="http://schemas.microsoft.com/office/drawing/2010/main">
+                <a:solidFill>
+                  <a:srgbClr val="FFFFFF"/>
+                </a:solidFill>
+              </a14:hiddenFill>
+            </a:ext>
+          </a:extLst>
+        </p:spPr>
+      </p:pic>
+      <p:pic>
+        <p:nvPicPr>
+          <p:cNvPr id="27" name="Picture 12" descr="Building an image recognition endpoint with Serverless and Google Cloud  Functions.">
+            <a:extLst>
+              <a:ext uri="{FF2B5EF4-FFF2-40B4-BE49-F238E27FC236}">
+                <a16:creationId xmlns:a16="http://schemas.microsoft.com/office/drawing/2014/main" id="{F5981711-0EFD-F334-79D6-7F44EA5DE147}"/>
+              </a:ext>
+            </a:extLst>
+          </p:cNvPr>
+          <p:cNvPicPr>
+            <a:picLocks noChangeAspect="1" noChangeArrowheads="1"/>
+          </p:cNvPicPr>
+          <p:nvPr/>
+        </p:nvPicPr>
+        <p:blipFill>
+          <a:blip r:embed="rId9">
+            <a:extLst>
+              <a:ext uri="{28A0092B-C50C-407E-A947-70E740481C1C}">
+                <a14:useLocalDpi xmlns:a14="http://schemas.microsoft.com/office/drawing/2010/main" val="0"/>
+              </a:ext>
+            </a:extLst>
+          </a:blip>
+          <a:srcRect/>
+          <a:stretch>
+            <a:fillRect/>
+          </a:stretch>
+        </p:blipFill>
+        <p:spPr bwMode="auto">
+          <a:xfrm>
+            <a:off x="6196594" y="4412722"/>
+            <a:ext cx="539595" cy="539595"/>
+          </a:xfrm>
+          <a:prstGeom prst="rect">
+            <a:avLst/>
+          </a:prstGeom>
+          <a:noFill/>
+          <a:extLst>
+            <a:ext uri="{909E8E84-426E-40DD-AFC4-6F175D3DCCD1}">
+              <a14:hiddenFill xmlns:a14="http://schemas.microsoft.com/office/drawing/2010/main">
+                <a:solidFill>
+                  <a:srgbClr val="FFFFFF"/>
+                </a:solidFill>
+              </a14:hiddenFill>
+            </a:ext>
+          </a:extLst>
+        </p:spPr>
+      </p:pic>
+      <p:pic>
+        <p:nvPicPr>
+          <p:cNvPr id="28" name="Picture 2" descr="Image result for nginx">
+            <a:extLst>
+              <a:ext uri="{FF2B5EF4-FFF2-40B4-BE49-F238E27FC236}">
+                <a16:creationId xmlns:a16="http://schemas.microsoft.com/office/drawing/2014/main" id="{0F947C9D-71C8-0418-3491-E24163117466}"/>
+              </a:ext>
+            </a:extLst>
+          </p:cNvPr>
+          <p:cNvPicPr>
+            <a:picLocks noChangeAspect="1" noChangeArrowheads="1"/>
+          </p:cNvPicPr>
+          <p:nvPr/>
+        </p:nvPicPr>
+        <p:blipFill>
+          <a:blip r:embed="rId2">
+            <a:extLst>
+              <a:ext uri="{28A0092B-C50C-407E-A947-70E740481C1C}">
+                <a14:useLocalDpi xmlns:a14="http://schemas.microsoft.com/office/drawing/2010/main" val="0"/>
+              </a:ext>
+            </a:extLst>
+          </a:blip>
+          <a:srcRect/>
+          <a:stretch>
+            <a:fillRect/>
+          </a:stretch>
+        </p:blipFill>
+        <p:spPr bwMode="auto">
+          <a:xfrm>
+            <a:off x="4040910" y="4399261"/>
+            <a:ext cx="512661" cy="595968"/>
+          </a:xfrm>
+          <a:prstGeom prst="rect">
+            <a:avLst/>
+          </a:prstGeom>
+          <a:noFill/>
+          <a:extLst>
+            <a:ext uri="{909E8E84-426E-40DD-AFC4-6F175D3DCCD1}">
+              <a14:hiddenFill xmlns:a14="http://schemas.microsoft.com/office/drawing/2010/main">
+                <a:solidFill>
+                  <a:srgbClr val="FFFFFF"/>
+                </a:solidFill>
+              </a14:hiddenFill>
+            </a:ext>
+          </a:extLst>
+        </p:spPr>
+      </p:pic>
+      <p:pic>
+        <p:nvPicPr>
+          <p:cNvPr id="29" name="Picture 12" descr="Building an image recognition endpoint with Serverless and Google Cloud  Functions.">
+            <a:extLst>
+              <a:ext uri="{FF2B5EF4-FFF2-40B4-BE49-F238E27FC236}">
+                <a16:creationId xmlns:a16="http://schemas.microsoft.com/office/drawing/2014/main" id="{C4C28331-9F42-1369-C059-CFDCA8039FD4}"/>
+              </a:ext>
+            </a:extLst>
+          </p:cNvPr>
+          <p:cNvPicPr>
+            <a:picLocks noChangeAspect="1" noChangeArrowheads="1"/>
+          </p:cNvPicPr>
+          <p:nvPr/>
+        </p:nvPicPr>
+        <p:blipFill>
+          <a:blip r:embed="rId9">
+            <a:clrChange>
+              <a:clrFrom>
+                <a:srgbClr val="FFFFFF"/>
+              </a:clrFrom>
+              <a:clrTo>
+                <a:srgbClr val="FFFFFF">
+                  <a:alpha val="0"/>
+                </a:srgbClr>
+              </a:clrTo>
+            </a:clrChange>
+            <a:extLst>
+              <a:ext uri="{28A0092B-C50C-407E-A947-70E740481C1C}">
+                <a14:useLocalDpi xmlns:a14="http://schemas.microsoft.com/office/drawing/2010/main" val="0"/>
+              </a:ext>
+            </a:extLst>
+          </a:blip>
+          <a:srcRect/>
+          <a:stretch>
+            <a:fillRect/>
+          </a:stretch>
+        </p:blipFill>
+        <p:spPr bwMode="auto">
+          <a:xfrm>
+            <a:off x="4451871" y="4764183"/>
+            <a:ext cx="253735" cy="253735"/>
+          </a:xfrm>
+          <a:prstGeom prst="rect">
+            <a:avLst/>
+          </a:prstGeom>
+          <a:noFill/>
+          <a:extLst>
+            <a:ext uri="{909E8E84-426E-40DD-AFC4-6F175D3DCCD1}">
+              <a14:hiddenFill xmlns:a14="http://schemas.microsoft.com/office/drawing/2010/main">
+                <a:solidFill>
+                  <a:srgbClr val="FFFFFF"/>
+                </a:solidFill>
+              </a14:hiddenFill>
+            </a:ext>
+          </a:extLst>
+        </p:spPr>
+      </p:pic>
+      <p:sp>
+        <p:nvSpPr>
+          <p:cNvPr id="30" name="직사각형 256">
+            <a:extLst>
+              <a:ext uri="{FF2B5EF4-FFF2-40B4-BE49-F238E27FC236}">
+                <a16:creationId xmlns:a16="http://schemas.microsoft.com/office/drawing/2014/main" id="{08067BDC-A5F0-59C0-301E-A209DE97D6DA}"/>
+              </a:ext>
+            </a:extLst>
+          </p:cNvPr>
+          <p:cNvSpPr/>
+          <p:nvPr/>
+        </p:nvSpPr>
+        <p:spPr>
+          <a:xfrm>
+            <a:off x="3424439" y="3989718"/>
+            <a:ext cx="1926040" cy="151388"/>
+          </a:xfrm>
+          <a:prstGeom prst="rect">
+            <a:avLst/>
+          </a:prstGeom>
+        </p:spPr>
+        <p:txBody>
+          <a:bodyPr wrap="none" lIns="0" tIns="0" rIns="0" bIns="0">
+            <a:spAutoFit/>
+          </a:bodyPr>
+          <a:lstStyle/>
+          <a:p>
+            <a:pPr algn="ctr">
+              <a:lnSpc>
+                <a:spcPct val="80000"/>
+              </a:lnSpc>
+            </a:pPr>
+            <a:r>
+              <a:rPr lang="en-US" altLang="ko-KR" sz="1200" dirty="0">
+                <a:solidFill>
+                  <a:prstClr val="black"/>
+                </a:solidFill>
+                <a:latin typeface="Calibri" panose="020F0502020204030204" pitchFamily="34" charset="0"/>
+              </a:rPr>
+              <a:t>nginx-azure-functions-gateway</a:t>
+            </a:r>
+            <a:endParaRPr lang="ko-KR" altLang="en-US" sz="1200" dirty="0">
+              <a:solidFill>
+                <a:prstClr val="black"/>
+              </a:solidFill>
+              <a:latin typeface="Calibri" panose="020F0502020204030204" pitchFamily="34" charset="0"/>
+            </a:endParaRPr>
+          </a:p>
+        </p:txBody>
+      </p:sp>
+      <p:sp>
+        <p:nvSpPr>
+          <p:cNvPr id="31" name="직사각형 256">
+            <a:extLst>
+              <a:ext uri="{FF2B5EF4-FFF2-40B4-BE49-F238E27FC236}">
+                <a16:creationId xmlns:a16="http://schemas.microsoft.com/office/drawing/2014/main" id="{9B6447BE-C9E7-7E4E-1BA5-074032023C87}"/>
+              </a:ext>
+            </a:extLst>
+          </p:cNvPr>
+          <p:cNvSpPr/>
+          <p:nvPr/>
+        </p:nvSpPr>
+        <p:spPr>
+          <a:xfrm>
+            <a:off x="3449318" y="5065700"/>
+            <a:ext cx="1901161" cy="299121"/>
+          </a:xfrm>
+          <a:prstGeom prst="rect">
+            <a:avLst/>
+          </a:prstGeom>
+        </p:spPr>
+        <p:txBody>
+          <a:bodyPr wrap="none" lIns="0" tIns="0" rIns="0" bIns="0">
+            <a:spAutoFit/>
+          </a:bodyPr>
+          <a:lstStyle/>
+          <a:p>
+            <a:pPr algn="ctr">
+              <a:lnSpc>
+                <a:spcPct val="80000"/>
+              </a:lnSpc>
+            </a:pPr>
+            <a:r>
+              <a:rPr lang="en-US" altLang="ko-KR" sz="1200" dirty="0">
+                <a:solidFill>
+                  <a:prstClr val="black"/>
+                </a:solidFill>
+                <a:latin typeface="Calibri" panose="020F0502020204030204" pitchFamily="34" charset="0"/>
+              </a:rPr>
+              <a:t>nginx-</a:t>
+            </a:r>
+            <a:r>
+              <a:rPr lang="en-US" altLang="ko-KR" sz="1200" dirty="0" err="1">
+                <a:solidFill>
+                  <a:prstClr val="black"/>
+                </a:solidFill>
+                <a:latin typeface="Calibri" panose="020F0502020204030204" pitchFamily="34" charset="0"/>
+              </a:rPr>
+              <a:t>gcf</a:t>
+            </a:r>
+            <a:r>
+              <a:rPr lang="en-US" altLang="ko-KR" sz="1200" dirty="0">
+                <a:solidFill>
+                  <a:prstClr val="black"/>
+                </a:solidFill>
+                <a:latin typeface="Calibri" panose="020F0502020204030204" pitchFamily="34" charset="0"/>
+              </a:rPr>
+              <a:t>-gateway</a:t>
+            </a:r>
+          </a:p>
+          <a:p>
+            <a:pPr algn="ctr">
+              <a:lnSpc>
+                <a:spcPct val="80000"/>
+              </a:lnSpc>
+            </a:pPr>
+            <a:r>
+              <a:rPr lang="en-US" altLang="ko-KR" sz="1200" dirty="0">
+                <a:solidFill>
+                  <a:schemeClr val="bg1">
+                    <a:lumMod val="65000"/>
+                  </a:schemeClr>
+                </a:solidFill>
+                <a:latin typeface="Calibri" panose="020F0502020204030204" pitchFamily="34" charset="0"/>
+              </a:rPr>
+              <a:t>(GCF: Google Cloud Functions)</a:t>
+            </a:r>
+            <a:endParaRPr lang="ko-KR" altLang="en-US" sz="1200" dirty="0">
+              <a:solidFill>
+                <a:schemeClr val="bg1">
+                  <a:lumMod val="65000"/>
+                </a:schemeClr>
+              </a:solidFill>
+              <a:latin typeface="Calibri" panose="020F0502020204030204" pitchFamily="34" charset="0"/>
+            </a:endParaRPr>
+          </a:p>
+        </p:txBody>
+      </p:sp>
+      <p:cxnSp>
+        <p:nvCxnSpPr>
+          <p:cNvPr id="32" name="Straight Arrow Connector 31">
+            <a:extLst>
+              <a:ext uri="{FF2B5EF4-FFF2-40B4-BE49-F238E27FC236}">
+                <a16:creationId xmlns:a16="http://schemas.microsoft.com/office/drawing/2014/main" id="{596D290A-3987-FA7F-D00D-3EA0CF1A518B}"/>
+              </a:ext>
+            </a:extLst>
+          </p:cNvPr>
+          <p:cNvCxnSpPr>
+            <a:cxnSpLocks/>
+            <a:stCxn id="19" idx="2"/>
+            <a:endCxn id="15" idx="0"/>
+          </p:cNvCxnSpPr>
+          <p:nvPr/>
+        </p:nvCxnSpPr>
+        <p:spPr>
+          <a:xfrm>
+            <a:off x="8554555" y="3664027"/>
+            <a:ext cx="300505" cy="1"/>
+          </a:xfrm>
+          <a:prstGeom prst="straightConnector1">
+            <a:avLst/>
+          </a:prstGeom>
+          <a:ln>
+            <a:solidFill>
+              <a:schemeClr val="tx1">
+                <a:lumMod val="50000"/>
+                <a:lumOff val="50000"/>
+              </a:schemeClr>
+            </a:solidFill>
+            <a:prstDash val="dash"/>
+            <a:headEnd type="triangle" w="sm" len="sm"/>
+            <a:tailEnd type="triangle" w="sm" len="sm"/>
+          </a:ln>
+        </p:spPr>
+        <p:style>
+          <a:lnRef idx="1">
+            <a:schemeClr val="accent1"/>
+          </a:lnRef>
+          <a:fillRef idx="0">
+            <a:schemeClr val="accent1"/>
+          </a:fillRef>
+          <a:effectRef idx="0">
+            <a:schemeClr val="accent1"/>
+          </a:effectRef>
+          <a:fontRef idx="minor">
+            <a:schemeClr val="tx1"/>
+          </a:fontRef>
+        </p:style>
+      </p:cxnSp>
+      <p:pic>
+        <p:nvPicPr>
+          <p:cNvPr id="33" name="Picture 10" descr="Azure Functions (@AzureFunctions) / Twitter">
+            <a:extLst>
+              <a:ext uri="{FF2B5EF4-FFF2-40B4-BE49-F238E27FC236}">
+                <a16:creationId xmlns:a16="http://schemas.microsoft.com/office/drawing/2014/main" id="{6EA12D90-0C58-FBFE-8D1B-88BE917E2688}"/>
+              </a:ext>
+            </a:extLst>
+          </p:cNvPr>
+          <p:cNvPicPr>
+            <a:picLocks noChangeAspect="1" noChangeArrowheads="1"/>
+          </p:cNvPicPr>
+          <p:nvPr/>
+        </p:nvPicPr>
+        <p:blipFill>
+          <a:blip r:embed="rId8">
+            <a:clrChange>
+              <a:clrFrom>
+                <a:srgbClr val="FFFFFF"/>
+              </a:clrFrom>
+              <a:clrTo>
+                <a:srgbClr val="FFFFFF">
+                  <a:alpha val="0"/>
+                </a:srgbClr>
+              </a:clrTo>
+            </a:clrChange>
+            <a:extLst>
+              <a:ext uri="{28A0092B-C50C-407E-A947-70E740481C1C}">
+                <a14:useLocalDpi xmlns:a14="http://schemas.microsoft.com/office/drawing/2010/main" val="0"/>
+              </a:ext>
+            </a:extLst>
+          </a:blip>
+          <a:srcRect/>
+          <a:stretch>
+            <a:fillRect/>
+          </a:stretch>
+        </p:blipFill>
+        <p:spPr bwMode="auto">
+          <a:xfrm>
+            <a:off x="4451871" y="3654400"/>
+            <a:ext cx="246707" cy="246707"/>
+          </a:xfrm>
+          <a:prstGeom prst="rect">
+            <a:avLst/>
+          </a:prstGeom>
+          <a:noFill/>
+          <a:extLst>
+            <a:ext uri="{909E8E84-426E-40DD-AFC4-6F175D3DCCD1}">
+              <a14:hiddenFill xmlns:a14="http://schemas.microsoft.com/office/drawing/2010/main">
+                <a:solidFill>
+                  <a:srgbClr val="FFFFFF"/>
+                </a:solidFill>
+              </a14:hiddenFill>
+            </a:ext>
+          </a:extLst>
+        </p:spPr>
+      </p:pic>
+      <p:sp>
+        <p:nvSpPr>
+          <p:cNvPr id="34" name="직사각형 256">
+            <a:extLst>
+              <a:ext uri="{FF2B5EF4-FFF2-40B4-BE49-F238E27FC236}">
+                <a16:creationId xmlns:a16="http://schemas.microsoft.com/office/drawing/2014/main" id="{659748C4-8724-B757-B73E-5FE4057C0052}"/>
+              </a:ext>
+            </a:extLst>
+          </p:cNvPr>
+          <p:cNvSpPr/>
+          <p:nvPr/>
+        </p:nvSpPr>
+        <p:spPr>
+          <a:xfrm>
+            <a:off x="6055055" y="5060736"/>
+            <a:ext cx="839974" cy="299121"/>
+          </a:xfrm>
+          <a:prstGeom prst="rect">
+            <a:avLst/>
+          </a:prstGeom>
+        </p:spPr>
+        <p:txBody>
+          <a:bodyPr wrap="none" lIns="0" tIns="0" rIns="0" bIns="0">
+            <a:spAutoFit/>
+          </a:bodyPr>
+          <a:lstStyle/>
+          <a:p>
+            <a:pPr algn="ctr">
+              <a:lnSpc>
+                <a:spcPct val="80000"/>
+              </a:lnSpc>
+            </a:pPr>
+            <a:r>
+              <a:rPr lang="en-US" altLang="ko-KR" sz="1200" dirty="0">
+                <a:solidFill>
+                  <a:prstClr val="black"/>
+                </a:solidFill>
+                <a:latin typeface="Calibri" panose="020F0502020204030204" pitchFamily="34" charset="0"/>
+              </a:rPr>
+              <a:t>Google Cloud</a:t>
+            </a:r>
+          </a:p>
+          <a:p>
+            <a:pPr algn="ctr">
+              <a:lnSpc>
+                <a:spcPct val="80000"/>
+              </a:lnSpc>
+            </a:pPr>
+            <a:r>
+              <a:rPr lang="en-US" altLang="ko-KR" sz="1200" dirty="0">
+                <a:solidFill>
+                  <a:prstClr val="black"/>
+                </a:solidFill>
+                <a:latin typeface="Calibri" panose="020F0502020204030204" pitchFamily="34" charset="0"/>
+              </a:rPr>
+              <a:t>Functions</a:t>
+            </a:r>
+            <a:endParaRPr lang="ko-KR" altLang="en-US" sz="1200" dirty="0">
+              <a:solidFill>
+                <a:prstClr val="black"/>
+              </a:solidFill>
+              <a:latin typeface="Calibri" panose="020F0502020204030204" pitchFamily="34" charset="0"/>
+            </a:endParaRPr>
+          </a:p>
+        </p:txBody>
+      </p:sp>
+      <p:sp>
+        <p:nvSpPr>
+          <p:cNvPr id="35" name="직사각형 363">
+            <a:extLst>
+              <a:ext uri="{FF2B5EF4-FFF2-40B4-BE49-F238E27FC236}">
+                <a16:creationId xmlns:a16="http://schemas.microsoft.com/office/drawing/2014/main" id="{4FCF3864-4551-5C7B-9034-8E444168EF7E}"/>
+              </a:ext>
+            </a:extLst>
+          </p:cNvPr>
+          <p:cNvSpPr/>
+          <p:nvPr/>
+        </p:nvSpPr>
+        <p:spPr>
+          <a:xfrm rot="16200000">
+            <a:off x="6975150" y="2233132"/>
+            <a:ext cx="1691682" cy="1177776"/>
+          </a:xfrm>
+          <a:prstGeom prst="rect">
+            <a:avLst/>
+          </a:prstGeom>
+          <a:noFill/>
+          <a:ln w="3175" cap="flat" cmpd="sng" algn="ctr">
+            <a:solidFill>
+              <a:schemeClr val="tx1">
+                <a:lumMod val="50000"/>
+                <a:lumOff val="50000"/>
+              </a:schemeClr>
+            </a:solidFill>
+            <a:prstDash val="dash"/>
+            <a:miter lim="800000"/>
+          </a:ln>
+          <a:effectLst/>
+        </p:spPr>
+        <p:txBody>
+          <a:bodyPr vert="vert" lIns="0" tIns="0" rIns="0" bIns="0" rtlCol="0" anchor="ctr"/>
+          <a:lstStyle/>
+          <a:p>
+            <a:pPr algn="ctr">
+              <a:lnSpc>
+                <a:spcPct val="80000"/>
+              </a:lnSpc>
+            </a:pPr>
+            <a:endParaRPr lang="ko-KR" altLang="en-US" sz="900" kern="0" dirty="0">
+              <a:solidFill>
+                <a:schemeClr val="bg1">
+                  <a:lumMod val="65000"/>
+                </a:schemeClr>
+              </a:solidFill>
+              <a:latin typeface="Calibri" panose="020F0502020204030204" pitchFamily="34" charset="0"/>
+              <a:ea typeface="맑은 고딕"/>
+            </a:endParaRPr>
+          </a:p>
+        </p:txBody>
+      </p:sp>
+      <p:sp>
+        <p:nvSpPr>
+          <p:cNvPr id="36" name="직사각형 363">
+            <a:extLst>
+              <a:ext uri="{FF2B5EF4-FFF2-40B4-BE49-F238E27FC236}">
+                <a16:creationId xmlns:a16="http://schemas.microsoft.com/office/drawing/2014/main" id="{988ABA42-A20B-A376-B0F5-4F0F14D0F4E3}"/>
+              </a:ext>
+            </a:extLst>
+          </p:cNvPr>
+          <p:cNvSpPr/>
+          <p:nvPr/>
+        </p:nvSpPr>
+        <p:spPr>
+          <a:xfrm rot="16200000">
+            <a:off x="6969483" y="4033352"/>
+            <a:ext cx="1691682" cy="1177778"/>
+          </a:xfrm>
+          <a:prstGeom prst="rect">
+            <a:avLst/>
+          </a:prstGeom>
+          <a:noFill/>
+          <a:ln w="3175" cap="flat" cmpd="sng" algn="ctr">
+            <a:solidFill>
+              <a:schemeClr val="tx1">
+                <a:lumMod val="50000"/>
+                <a:lumOff val="50000"/>
+              </a:schemeClr>
+            </a:solidFill>
+            <a:prstDash val="dash"/>
+            <a:miter lim="800000"/>
+          </a:ln>
+          <a:effectLst/>
+        </p:spPr>
+        <p:txBody>
+          <a:bodyPr vert="vert" wrap="square" lIns="0" tIns="182880" rIns="0" bIns="0" rtlCol="0" anchor="ctr"/>
+          <a:lstStyle/>
+          <a:p>
+            <a:pPr marL="171450" indent="-171450">
+              <a:buFont typeface="Arial" panose="020B0604020202020204" pitchFamily="34" charset="0"/>
+              <a:buChar char="•"/>
+            </a:pPr>
+            <a:endParaRPr lang="en-US" altLang="ko-KR" sz="900" kern="0" dirty="0">
+              <a:solidFill>
+                <a:schemeClr val="bg1">
+                  <a:lumMod val="65000"/>
+                </a:schemeClr>
+              </a:solidFill>
+              <a:latin typeface="Calibri" panose="020F0502020204030204" pitchFamily="34" charset="0"/>
+              <a:ea typeface="맑은 고딕"/>
+            </a:endParaRPr>
+          </a:p>
+          <a:p>
+            <a:pPr marL="171450" indent="-171450">
+              <a:buFont typeface="Arial" panose="020B0604020202020204" pitchFamily="34" charset="0"/>
+              <a:buChar char="•"/>
+            </a:pPr>
+            <a:endParaRPr lang="en-US" altLang="ko-KR" sz="900" kern="0" dirty="0">
+              <a:solidFill>
+                <a:schemeClr val="bg1">
+                  <a:lumMod val="65000"/>
+                </a:schemeClr>
+              </a:solidFill>
+              <a:latin typeface="Calibri" panose="020F0502020204030204" pitchFamily="34" charset="0"/>
+              <a:ea typeface="맑은 고딕"/>
+            </a:endParaRPr>
+          </a:p>
+          <a:p>
+            <a:pPr marL="171450" indent="-171450">
+              <a:buFont typeface="Arial" panose="020B0604020202020204" pitchFamily="34" charset="0"/>
+              <a:buChar char="•"/>
+            </a:pPr>
+            <a:r>
+              <a:rPr lang="en-US" altLang="ko-KR" sz="900" kern="0" dirty="0">
+                <a:solidFill>
+                  <a:schemeClr val="bg1">
+                    <a:lumMod val="65000"/>
+                  </a:schemeClr>
+                </a:solidFill>
+                <a:latin typeface="Calibri" panose="020F0502020204030204" pitchFamily="34" charset="0"/>
+                <a:ea typeface="맑은 고딕"/>
+              </a:rPr>
+              <a:t>Go</a:t>
+            </a:r>
+          </a:p>
+          <a:p>
+            <a:pPr marL="171450" indent="-171450">
+              <a:buFont typeface="Arial" panose="020B0604020202020204" pitchFamily="34" charset="0"/>
+              <a:buChar char="•"/>
+            </a:pPr>
+            <a:r>
+              <a:rPr lang="en-US" altLang="ko-KR" sz="900" kern="0" dirty="0">
+                <a:solidFill>
+                  <a:schemeClr val="bg1">
+                    <a:lumMod val="65000"/>
+                  </a:schemeClr>
+                </a:solidFill>
+                <a:latin typeface="Calibri" panose="020F0502020204030204" pitchFamily="34" charset="0"/>
+                <a:ea typeface="맑은 고딕"/>
+              </a:rPr>
+              <a:t>Python</a:t>
+            </a:r>
+          </a:p>
+          <a:p>
+            <a:pPr marL="171450" indent="-171450">
+              <a:buFont typeface="Arial" panose="020B0604020202020204" pitchFamily="34" charset="0"/>
+              <a:buChar char="•"/>
+            </a:pPr>
+            <a:r>
+              <a:rPr lang="en-US" altLang="ko-KR" sz="900" kern="0" dirty="0" err="1">
+                <a:solidFill>
+                  <a:schemeClr val="bg1">
+                    <a:lumMod val="65000"/>
+                  </a:schemeClr>
+                </a:solidFill>
+                <a:latin typeface="Calibri" panose="020F0502020204030204" pitchFamily="34" charset="0"/>
+                <a:ea typeface="맑은 고딕"/>
+              </a:rPr>
+              <a:t>Node.JS</a:t>
+            </a:r>
+            <a:endParaRPr lang="en-US" altLang="ko-KR" sz="900" kern="0" dirty="0">
+              <a:solidFill>
+                <a:schemeClr val="bg1">
+                  <a:lumMod val="65000"/>
+                </a:schemeClr>
+              </a:solidFill>
+              <a:latin typeface="Calibri" panose="020F0502020204030204" pitchFamily="34" charset="0"/>
+              <a:ea typeface="맑은 고딕"/>
+            </a:endParaRPr>
+          </a:p>
+          <a:p>
+            <a:pPr marL="171450" indent="-171450">
+              <a:buFont typeface="Arial" panose="020B0604020202020204" pitchFamily="34" charset="0"/>
+              <a:buChar char="•"/>
+            </a:pPr>
+            <a:r>
+              <a:rPr lang="en-US" altLang="ko-KR" sz="900" kern="0" dirty="0">
+                <a:solidFill>
+                  <a:schemeClr val="bg1">
+                    <a:lumMod val="65000"/>
+                  </a:schemeClr>
+                </a:solidFill>
+                <a:latin typeface="Calibri" panose="020F0502020204030204" pitchFamily="34" charset="0"/>
+                <a:ea typeface="맑은 고딕"/>
+              </a:rPr>
+              <a:t>C#</a:t>
+            </a:r>
+          </a:p>
+          <a:p>
+            <a:pPr marL="171450" indent="-171450">
+              <a:buFont typeface="Arial" panose="020B0604020202020204" pitchFamily="34" charset="0"/>
+              <a:buChar char="•"/>
+            </a:pPr>
+            <a:r>
+              <a:rPr lang="en-US" altLang="ko-KR" sz="900" kern="0" dirty="0">
+                <a:solidFill>
+                  <a:schemeClr val="bg1">
+                    <a:lumMod val="65000"/>
+                  </a:schemeClr>
+                </a:solidFill>
+                <a:latin typeface="Calibri" panose="020F0502020204030204" pitchFamily="34" charset="0"/>
+                <a:ea typeface="맑은 고딕"/>
+              </a:rPr>
+              <a:t>Java</a:t>
+            </a:r>
+          </a:p>
+          <a:p>
+            <a:pPr marL="171450" indent="-171450">
+              <a:buFont typeface="Arial" panose="020B0604020202020204" pitchFamily="34" charset="0"/>
+              <a:buChar char="•"/>
+            </a:pPr>
+            <a:r>
+              <a:rPr lang="en-US" altLang="ko-KR" sz="900" kern="0" dirty="0">
+                <a:solidFill>
+                  <a:schemeClr val="bg1">
+                    <a:lumMod val="65000"/>
+                  </a:schemeClr>
+                </a:solidFill>
+                <a:latin typeface="Calibri" panose="020F0502020204030204" pitchFamily="34" charset="0"/>
+                <a:ea typeface="맑은 고딕"/>
+              </a:rPr>
+              <a:t>C++</a:t>
+            </a:r>
+          </a:p>
+        </p:txBody>
+      </p:sp>
+      <p:sp>
+        <p:nvSpPr>
+          <p:cNvPr id="37" name="직사각형 363">
+            <a:extLst>
+              <a:ext uri="{FF2B5EF4-FFF2-40B4-BE49-F238E27FC236}">
+                <a16:creationId xmlns:a16="http://schemas.microsoft.com/office/drawing/2014/main" id="{3EA6A14F-9137-9575-1C6B-7A7A2F6C80C1}"/>
+              </a:ext>
+            </a:extLst>
+          </p:cNvPr>
+          <p:cNvSpPr/>
+          <p:nvPr/>
+        </p:nvSpPr>
+        <p:spPr>
+          <a:xfrm>
+            <a:off x="7232184" y="1963657"/>
+            <a:ext cx="1177776" cy="306850"/>
+          </a:xfrm>
+          <a:prstGeom prst="rect">
+            <a:avLst/>
+          </a:prstGeom>
+          <a:solidFill>
+            <a:schemeClr val="accent6">
+              <a:lumMod val="20000"/>
+              <a:lumOff val="80000"/>
+            </a:schemeClr>
+          </a:solidFill>
+          <a:ln w="3175" cap="flat" cmpd="sng" algn="ctr">
+            <a:noFill/>
+            <a:prstDash val="solid"/>
+            <a:miter lim="800000"/>
+          </a:ln>
+          <a:effectLst/>
+        </p:spPr>
+        <p:txBody>
+          <a:bodyPr lIns="0" rIns="0" rtlCol="0" anchor="ctr"/>
+          <a:lstStyle/>
+          <a:p>
+            <a:pPr marL="0" marR="0" lvl="0" indent="0" defTabSz="914400" eaLnBrk="1" fontAlgn="auto" latinLnBrk="0" hangingPunct="1">
+              <a:lnSpc>
+                <a:spcPct val="80000"/>
+              </a:lnSpc>
+              <a:spcBef>
+                <a:spcPts val="0"/>
+              </a:spcBef>
+              <a:spcAft>
+                <a:spcPts val="0"/>
+              </a:spcAft>
+              <a:buClrTx/>
+              <a:buSzTx/>
+              <a:buFontTx/>
+              <a:buNone/>
+              <a:tabLst/>
+              <a:defRPr/>
+            </a:pPr>
+            <a:r>
+              <a:rPr kumimoji="0" lang="en-US" altLang="ko-KR" sz="1000" b="0" i="0" u="none" strike="noStrike" kern="0" cap="none" spc="0" normalizeH="0" baseline="0" noProof="0" dirty="0">
+                <a:ln>
+                  <a:noFill/>
+                </a:ln>
+                <a:solidFill>
+                  <a:prstClr val="black"/>
+                </a:solidFill>
+                <a:effectLst/>
+                <a:uLnTx/>
+                <a:uFillTx/>
+                <a:latin typeface="Calibri" panose="020F0502020204030204" pitchFamily="34" charset="0"/>
+                <a:ea typeface="맑은 고딕"/>
+              </a:rPr>
+              <a:t>         NGINX Payment </a:t>
+            </a:r>
+          </a:p>
+          <a:p>
+            <a:pPr marL="0" marR="0" lvl="0" indent="0" defTabSz="914400" eaLnBrk="1" fontAlgn="auto" latinLnBrk="0" hangingPunct="1">
+              <a:lnSpc>
+                <a:spcPct val="80000"/>
+              </a:lnSpc>
+              <a:spcBef>
+                <a:spcPts val="0"/>
+              </a:spcBef>
+              <a:spcAft>
+                <a:spcPts val="0"/>
+              </a:spcAft>
+              <a:buClrTx/>
+              <a:buSzTx/>
+              <a:buFontTx/>
+              <a:buNone/>
+              <a:tabLst/>
+              <a:defRPr/>
+            </a:pPr>
+            <a:r>
+              <a:rPr kumimoji="0" lang="en-US" altLang="ko-KR" sz="1000" b="0" i="0" u="none" strike="noStrike" kern="0" cap="none" spc="0" normalizeH="0" baseline="0" noProof="0" dirty="0">
+                <a:ln>
+                  <a:noFill/>
+                </a:ln>
+                <a:solidFill>
+                  <a:prstClr val="black"/>
+                </a:solidFill>
+                <a:effectLst/>
+                <a:uLnTx/>
+                <a:uFillTx/>
+                <a:latin typeface="Calibri" panose="020F0502020204030204" pitchFamily="34" charset="0"/>
+                <a:ea typeface="맑은 고딕"/>
+              </a:rPr>
+              <a:t>         Service Bundle</a:t>
+            </a:r>
+            <a:endParaRPr kumimoji="0" lang="ko-KR" altLang="en-US" sz="1000" b="0" i="0" u="none" strike="noStrike" kern="0" cap="none" spc="0" normalizeH="0" baseline="0" noProof="0" dirty="0">
+              <a:ln>
+                <a:noFill/>
+              </a:ln>
+              <a:solidFill>
+                <a:schemeClr val="tx1">
+                  <a:lumMod val="50000"/>
+                  <a:lumOff val="50000"/>
+                </a:schemeClr>
+              </a:solidFill>
+              <a:effectLst/>
+              <a:uLnTx/>
+              <a:uFillTx/>
+              <a:latin typeface="Calibri" panose="020F0502020204030204" pitchFamily="34" charset="0"/>
+              <a:ea typeface="맑은 고딕"/>
+            </a:endParaRPr>
+          </a:p>
+        </p:txBody>
+      </p:sp>
+      <p:pic>
+        <p:nvPicPr>
+          <p:cNvPr id="38" name="Picture 14" descr="Top 10 Online Courses to learn Golang/Go in 2022 — Best of Lot | by  javinpaul | Javarevisited | Medium">
+            <a:extLst>
+              <a:ext uri="{FF2B5EF4-FFF2-40B4-BE49-F238E27FC236}">
+                <a16:creationId xmlns:a16="http://schemas.microsoft.com/office/drawing/2014/main" id="{1855A41F-22DE-1330-FEEB-236410BE2553}"/>
+              </a:ext>
+            </a:extLst>
+          </p:cNvPr>
+          <p:cNvPicPr>
+            <a:picLocks noChangeAspect="1" noChangeArrowheads="1"/>
+          </p:cNvPicPr>
+          <p:nvPr/>
+        </p:nvPicPr>
+        <p:blipFill>
+          <a:blip r:embed="rId10">
+            <a:extLst>
+              <a:ext uri="{28A0092B-C50C-407E-A947-70E740481C1C}">
+                <a14:useLocalDpi xmlns:a14="http://schemas.microsoft.com/office/drawing/2010/main" val="0"/>
+              </a:ext>
+            </a:extLst>
+          </a:blip>
+          <a:srcRect/>
+          <a:stretch>
+            <a:fillRect/>
+          </a:stretch>
+        </p:blipFill>
+        <p:spPr bwMode="auto">
+          <a:xfrm>
+            <a:off x="7456266" y="2364522"/>
+            <a:ext cx="734539" cy="415174"/>
+          </a:xfrm>
+          <a:prstGeom prst="rect">
+            <a:avLst/>
+          </a:prstGeom>
+          <a:noFill/>
+          <a:extLst>
+            <a:ext uri="{909E8E84-426E-40DD-AFC4-6F175D3DCCD1}">
+              <a14:hiddenFill xmlns:a14="http://schemas.microsoft.com/office/drawing/2010/main">
+                <a:solidFill>
+                  <a:srgbClr val="FFFFFF"/>
+                </a:solidFill>
+              </a14:hiddenFill>
+            </a:ext>
+          </a:extLst>
+        </p:spPr>
+      </p:pic>
+      <p:pic>
+        <p:nvPicPr>
+          <p:cNvPr id="39" name="Picture 16">
+            <a:extLst>
+              <a:ext uri="{FF2B5EF4-FFF2-40B4-BE49-F238E27FC236}">
+                <a16:creationId xmlns:a16="http://schemas.microsoft.com/office/drawing/2014/main" id="{41C31C54-EAF3-C8C5-F578-387EDE4DDB0C}"/>
+              </a:ext>
+            </a:extLst>
+          </p:cNvPr>
+          <p:cNvPicPr>
+            <a:picLocks noChangeAspect="1" noChangeArrowheads="1"/>
+          </p:cNvPicPr>
+          <p:nvPr/>
+        </p:nvPicPr>
+        <p:blipFill>
+          <a:blip r:embed="rId11">
+            <a:extLst>
+              <a:ext uri="{28A0092B-C50C-407E-A947-70E740481C1C}">
+                <a14:useLocalDpi xmlns:a14="http://schemas.microsoft.com/office/drawing/2010/main" val="0"/>
+              </a:ext>
+            </a:extLst>
+          </a:blip>
+          <a:srcRect/>
+          <a:stretch>
+            <a:fillRect/>
+          </a:stretch>
+        </p:blipFill>
+        <p:spPr bwMode="auto">
+          <a:xfrm>
+            <a:off x="7456265" y="2879020"/>
+            <a:ext cx="734540" cy="216983"/>
+          </a:xfrm>
+          <a:prstGeom prst="rect">
+            <a:avLst/>
+          </a:prstGeom>
+          <a:noFill/>
+          <a:extLst>
+            <a:ext uri="{909E8E84-426E-40DD-AFC4-6F175D3DCCD1}">
+              <a14:hiddenFill xmlns:a14="http://schemas.microsoft.com/office/drawing/2010/main">
+                <a:solidFill>
+                  <a:srgbClr val="FFFFFF"/>
+                </a:solidFill>
+              </a14:hiddenFill>
+            </a:ext>
+          </a:extLst>
+        </p:spPr>
+      </p:pic>
+      <p:pic>
+        <p:nvPicPr>
+          <p:cNvPr id="40" name="Picture 39">
+            <a:extLst>
+              <a:ext uri="{FF2B5EF4-FFF2-40B4-BE49-F238E27FC236}">
+                <a16:creationId xmlns:a16="http://schemas.microsoft.com/office/drawing/2014/main" id="{3A3A0EC4-BAB0-01A0-80BD-0480CA25FC5B}"/>
+              </a:ext>
+            </a:extLst>
+          </p:cNvPr>
+          <p:cNvPicPr>
+            <a:picLocks noChangeAspect="1"/>
+          </p:cNvPicPr>
+          <p:nvPr/>
+        </p:nvPicPr>
+        <p:blipFill>
+          <a:blip r:embed="rId12"/>
+          <a:stretch>
+            <a:fillRect/>
+          </a:stretch>
+        </p:blipFill>
+        <p:spPr>
+          <a:xfrm>
+            <a:off x="7439682" y="3195327"/>
+            <a:ext cx="810144" cy="306851"/>
+          </a:xfrm>
+          <a:prstGeom prst="rect">
+            <a:avLst/>
+          </a:prstGeom>
+        </p:spPr>
+      </p:pic>
+      <p:pic>
+        <p:nvPicPr>
+          <p:cNvPr id="41" name="Picture 2" descr="Image result for nginx">
+            <a:extLst>
+              <a:ext uri="{FF2B5EF4-FFF2-40B4-BE49-F238E27FC236}">
+                <a16:creationId xmlns:a16="http://schemas.microsoft.com/office/drawing/2014/main" id="{CEB2DBFB-405D-C6A5-61E6-AF373C407DAA}"/>
+              </a:ext>
+            </a:extLst>
+          </p:cNvPr>
+          <p:cNvPicPr>
+            <a:picLocks noChangeAspect="1" noChangeArrowheads="1"/>
+          </p:cNvPicPr>
+          <p:nvPr/>
+        </p:nvPicPr>
+        <p:blipFill>
+          <a:blip r:embed="rId2">
+            <a:extLst>
+              <a:ext uri="{28A0092B-C50C-407E-A947-70E740481C1C}">
+                <a14:useLocalDpi xmlns:a14="http://schemas.microsoft.com/office/drawing/2010/main" val="0"/>
+              </a:ext>
+            </a:extLst>
+          </a:blip>
+          <a:srcRect/>
+          <a:stretch>
+            <a:fillRect/>
+          </a:stretch>
+        </p:blipFill>
+        <p:spPr bwMode="auto">
+          <a:xfrm>
+            <a:off x="7274514" y="2012875"/>
+            <a:ext cx="164035" cy="190690"/>
+          </a:xfrm>
+          <a:prstGeom prst="rect">
+            <a:avLst/>
+          </a:prstGeom>
+          <a:noFill/>
+          <a:extLst>
+            <a:ext uri="{909E8E84-426E-40DD-AFC4-6F175D3DCCD1}">
+              <a14:hiddenFill xmlns:a14="http://schemas.microsoft.com/office/drawing/2010/main">
+                <a:solidFill>
+                  <a:srgbClr val="FFFFFF"/>
+                </a:solidFill>
+              </a14:hiddenFill>
+            </a:ext>
+          </a:extLst>
+        </p:spPr>
+      </p:pic>
+      <p:sp>
+        <p:nvSpPr>
+          <p:cNvPr id="42" name="직사각형 363">
+            <a:extLst>
+              <a:ext uri="{FF2B5EF4-FFF2-40B4-BE49-F238E27FC236}">
+                <a16:creationId xmlns:a16="http://schemas.microsoft.com/office/drawing/2014/main" id="{94AC5860-EB22-8622-AFCC-DED1F155C49E}"/>
+              </a:ext>
+            </a:extLst>
+          </p:cNvPr>
+          <p:cNvSpPr/>
+          <p:nvPr/>
+        </p:nvSpPr>
+        <p:spPr>
+          <a:xfrm>
+            <a:off x="7234647" y="3779712"/>
+            <a:ext cx="1177776" cy="306850"/>
+          </a:xfrm>
+          <a:prstGeom prst="rect">
+            <a:avLst/>
+          </a:prstGeom>
+          <a:solidFill>
+            <a:schemeClr val="bg1">
+              <a:lumMod val="85000"/>
+            </a:schemeClr>
+          </a:solidFill>
+          <a:ln w="3175" cap="flat" cmpd="sng" algn="ctr">
+            <a:noFill/>
+            <a:prstDash val="solid"/>
+            <a:miter lim="800000"/>
+          </a:ln>
+          <a:effectLst/>
+        </p:spPr>
+        <p:txBody>
+          <a:bodyPr lIns="0" rIns="0" rtlCol="0" anchor="ctr"/>
+          <a:lstStyle/>
+          <a:p>
+            <a:pPr marL="0" marR="0" lvl="0" indent="0" algn="ctr" defTabSz="914400" eaLnBrk="1" fontAlgn="auto" latinLnBrk="0" hangingPunct="1">
+              <a:lnSpc>
+                <a:spcPct val="80000"/>
+              </a:lnSpc>
+              <a:spcBef>
+                <a:spcPts val="0"/>
+              </a:spcBef>
+              <a:spcAft>
+                <a:spcPts val="0"/>
+              </a:spcAft>
+              <a:buClrTx/>
+              <a:buSzTx/>
+              <a:buFontTx/>
+              <a:buNone/>
+              <a:tabLst/>
+              <a:defRPr/>
+            </a:pPr>
+            <a:r>
+              <a:rPr kumimoji="0" lang="en-US" altLang="ko-KR" sz="1000" b="0" i="0" u="none" strike="noStrike" kern="0" cap="none" spc="0" normalizeH="0" baseline="0" noProof="0" dirty="0">
+                <a:ln>
+                  <a:noFill/>
+                </a:ln>
+                <a:solidFill>
+                  <a:schemeClr val="bg1">
+                    <a:lumMod val="65000"/>
+                  </a:schemeClr>
+                </a:solidFill>
+                <a:effectLst/>
+                <a:uLnTx/>
+                <a:uFillTx/>
+                <a:latin typeface="Calibri" panose="020F0502020204030204" pitchFamily="34" charset="0"/>
+                <a:ea typeface="맑은 고딕"/>
+              </a:rPr>
+              <a:t>Custom Payment</a:t>
+            </a:r>
+          </a:p>
+          <a:p>
+            <a:pPr marL="0" marR="0" lvl="0" indent="0" algn="ctr" defTabSz="914400" eaLnBrk="1" fontAlgn="auto" latinLnBrk="0" hangingPunct="1">
+              <a:lnSpc>
+                <a:spcPct val="80000"/>
+              </a:lnSpc>
+              <a:spcBef>
+                <a:spcPts val="0"/>
+              </a:spcBef>
+              <a:spcAft>
+                <a:spcPts val="0"/>
+              </a:spcAft>
+              <a:buClrTx/>
+              <a:buSzTx/>
+              <a:buFontTx/>
+              <a:buNone/>
+              <a:tabLst/>
+              <a:defRPr/>
+            </a:pPr>
+            <a:r>
+              <a:rPr lang="en-US" altLang="ko-KR" sz="1000" kern="0" dirty="0">
+                <a:solidFill>
+                  <a:schemeClr val="bg1">
+                    <a:lumMod val="65000"/>
+                  </a:schemeClr>
+                </a:solidFill>
+                <a:latin typeface="Calibri" panose="020F0502020204030204" pitchFamily="34" charset="0"/>
+                <a:ea typeface="맑은 고딕"/>
+              </a:rPr>
+              <a:t>Service Codes</a:t>
+            </a:r>
+            <a:endParaRPr kumimoji="0" lang="ko-KR" altLang="en-US" sz="1000" b="0" i="0" u="none" strike="noStrike" kern="0" cap="none" spc="0" normalizeH="0" baseline="0" noProof="0" dirty="0">
+              <a:ln>
+                <a:noFill/>
+              </a:ln>
+              <a:solidFill>
+                <a:schemeClr val="bg1">
+                  <a:lumMod val="65000"/>
+                </a:schemeClr>
+              </a:solidFill>
+              <a:effectLst/>
+              <a:uLnTx/>
+              <a:uFillTx/>
+              <a:latin typeface="Calibri" panose="020F0502020204030204" pitchFamily="34" charset="0"/>
+              <a:ea typeface="맑은 고딕"/>
+            </a:endParaRPr>
+          </a:p>
+        </p:txBody>
+      </p:sp>
+      <p:cxnSp>
+        <p:nvCxnSpPr>
+          <p:cNvPr id="43" name="Straight Arrow Connector 42">
+            <a:extLst>
+              <a:ext uri="{FF2B5EF4-FFF2-40B4-BE49-F238E27FC236}">
+                <a16:creationId xmlns:a16="http://schemas.microsoft.com/office/drawing/2014/main" id="{F5BBE1B2-0A2A-7561-10D2-ABB4481A0012}"/>
+              </a:ext>
+            </a:extLst>
+          </p:cNvPr>
+          <p:cNvCxnSpPr>
+            <a:cxnSpLocks/>
+            <a:stCxn id="6" idx="3"/>
+            <a:endCxn id="35" idx="0"/>
+          </p:cNvCxnSpPr>
+          <p:nvPr/>
+        </p:nvCxnSpPr>
+        <p:spPr>
+          <a:xfrm>
+            <a:off x="6605208" y="2258341"/>
+            <a:ext cx="626895" cy="563679"/>
+          </a:xfrm>
+          <a:prstGeom prst="straightConnector1">
+            <a:avLst/>
+          </a:prstGeom>
+          <a:ln>
+            <a:solidFill>
+              <a:schemeClr val="tx1">
+                <a:lumMod val="50000"/>
+                <a:lumOff val="50000"/>
+              </a:schemeClr>
+            </a:solidFill>
+            <a:prstDash val="dash"/>
+            <a:tailEnd type="triangle" w="sm" len="sm"/>
+          </a:ln>
+        </p:spPr>
+        <p:style>
+          <a:lnRef idx="1">
+            <a:schemeClr val="accent1"/>
+          </a:lnRef>
+          <a:fillRef idx="0">
+            <a:schemeClr val="accent1"/>
+          </a:fillRef>
+          <a:effectRef idx="0">
+            <a:schemeClr val="accent1"/>
+          </a:effectRef>
+          <a:fontRef idx="minor">
+            <a:schemeClr val="tx1"/>
+          </a:fontRef>
+        </p:style>
+      </p:cxnSp>
+      <p:cxnSp>
+        <p:nvCxnSpPr>
+          <p:cNvPr id="44" name="Straight Arrow Connector 43">
+            <a:extLst>
+              <a:ext uri="{FF2B5EF4-FFF2-40B4-BE49-F238E27FC236}">
+                <a16:creationId xmlns:a16="http://schemas.microsoft.com/office/drawing/2014/main" id="{C499CB56-5845-59D1-4F9C-FA699FE61DF0}"/>
+              </a:ext>
+            </a:extLst>
+          </p:cNvPr>
+          <p:cNvCxnSpPr>
+            <a:cxnSpLocks/>
+            <a:stCxn id="24" idx="3"/>
+            <a:endCxn id="35" idx="0"/>
+          </p:cNvCxnSpPr>
+          <p:nvPr/>
+        </p:nvCxnSpPr>
+        <p:spPr>
+          <a:xfrm flipV="1">
+            <a:off x="6715845" y="2822020"/>
+            <a:ext cx="516258" cy="751513"/>
+          </a:xfrm>
+          <a:prstGeom prst="straightConnector1">
+            <a:avLst/>
+          </a:prstGeom>
+          <a:ln>
+            <a:solidFill>
+              <a:schemeClr val="tx1">
+                <a:lumMod val="50000"/>
+                <a:lumOff val="50000"/>
+              </a:schemeClr>
+            </a:solidFill>
+            <a:prstDash val="dash"/>
+            <a:tailEnd type="triangle" w="sm" len="sm"/>
+          </a:ln>
+        </p:spPr>
+        <p:style>
+          <a:lnRef idx="1">
+            <a:schemeClr val="accent1"/>
+          </a:lnRef>
+          <a:fillRef idx="0">
+            <a:schemeClr val="accent1"/>
+          </a:fillRef>
+          <a:effectRef idx="0">
+            <a:schemeClr val="accent1"/>
+          </a:effectRef>
+          <a:fontRef idx="minor">
+            <a:schemeClr val="tx1"/>
+          </a:fontRef>
+        </p:style>
+      </p:cxnSp>
+      <p:cxnSp>
+        <p:nvCxnSpPr>
+          <p:cNvPr id="45" name="Straight Arrow Connector 44">
+            <a:extLst>
+              <a:ext uri="{FF2B5EF4-FFF2-40B4-BE49-F238E27FC236}">
+                <a16:creationId xmlns:a16="http://schemas.microsoft.com/office/drawing/2014/main" id="{248A3853-0C1F-D0CE-B462-B9FE86D1D21A}"/>
+              </a:ext>
+            </a:extLst>
+          </p:cNvPr>
+          <p:cNvCxnSpPr>
+            <a:cxnSpLocks/>
+            <a:stCxn id="27" idx="3"/>
+            <a:endCxn id="35" idx="0"/>
+          </p:cNvCxnSpPr>
+          <p:nvPr/>
+        </p:nvCxnSpPr>
+        <p:spPr>
+          <a:xfrm flipV="1">
+            <a:off x="6736189" y="2822020"/>
+            <a:ext cx="495914" cy="1860500"/>
+          </a:xfrm>
+          <a:prstGeom prst="straightConnector1">
+            <a:avLst/>
+          </a:prstGeom>
+          <a:ln>
+            <a:solidFill>
+              <a:schemeClr val="tx1">
+                <a:lumMod val="50000"/>
+                <a:lumOff val="50000"/>
+              </a:schemeClr>
+            </a:solidFill>
+            <a:prstDash val="dash"/>
+            <a:tailEnd type="triangle" w="sm" len="sm"/>
+          </a:ln>
+        </p:spPr>
+        <p:style>
+          <a:lnRef idx="1">
+            <a:schemeClr val="accent1"/>
+          </a:lnRef>
+          <a:fillRef idx="0">
+            <a:schemeClr val="accent1"/>
+          </a:fillRef>
+          <a:effectRef idx="0">
+            <a:schemeClr val="accent1"/>
+          </a:effectRef>
+          <a:fontRef idx="minor">
+            <a:schemeClr val="tx1"/>
+          </a:fontRef>
+        </p:style>
+      </p:cxnSp>
+      <p:cxnSp>
+        <p:nvCxnSpPr>
+          <p:cNvPr id="46" name="Straight Arrow Connector 45">
+            <a:extLst>
+              <a:ext uri="{FF2B5EF4-FFF2-40B4-BE49-F238E27FC236}">
+                <a16:creationId xmlns:a16="http://schemas.microsoft.com/office/drawing/2014/main" id="{329A93F1-C6DA-634A-848A-A5C1C82EAFE6}"/>
+              </a:ext>
+            </a:extLst>
+          </p:cNvPr>
+          <p:cNvCxnSpPr>
+            <a:cxnSpLocks/>
+            <a:stCxn id="27" idx="3"/>
+            <a:endCxn id="36" idx="0"/>
+          </p:cNvCxnSpPr>
+          <p:nvPr/>
+        </p:nvCxnSpPr>
+        <p:spPr>
+          <a:xfrm flipV="1">
+            <a:off x="6736189" y="4622241"/>
+            <a:ext cx="490246" cy="60279"/>
+          </a:xfrm>
+          <a:prstGeom prst="straightConnector1">
+            <a:avLst/>
+          </a:prstGeom>
+          <a:ln>
+            <a:solidFill>
+              <a:schemeClr val="tx1">
+                <a:lumMod val="50000"/>
+                <a:lumOff val="50000"/>
+              </a:schemeClr>
+            </a:solidFill>
+            <a:prstDash val="dash"/>
+            <a:tailEnd type="triangle" w="sm" len="sm"/>
+          </a:ln>
+        </p:spPr>
+        <p:style>
+          <a:lnRef idx="1">
+            <a:schemeClr val="accent1"/>
+          </a:lnRef>
+          <a:fillRef idx="0">
+            <a:schemeClr val="accent1"/>
+          </a:fillRef>
+          <a:effectRef idx="0">
+            <a:schemeClr val="accent1"/>
+          </a:effectRef>
+          <a:fontRef idx="minor">
+            <a:schemeClr val="tx1"/>
+          </a:fontRef>
+        </p:style>
+      </p:cxnSp>
+      <p:cxnSp>
+        <p:nvCxnSpPr>
+          <p:cNvPr id="47" name="Straight Arrow Connector 46">
+            <a:extLst>
+              <a:ext uri="{FF2B5EF4-FFF2-40B4-BE49-F238E27FC236}">
+                <a16:creationId xmlns:a16="http://schemas.microsoft.com/office/drawing/2014/main" id="{22E84315-066B-C1CF-7F82-A30BFB2127A6}"/>
+              </a:ext>
+            </a:extLst>
+          </p:cNvPr>
+          <p:cNvCxnSpPr>
+            <a:cxnSpLocks/>
+            <a:stCxn id="24" idx="3"/>
+            <a:endCxn id="36" idx="0"/>
+          </p:cNvCxnSpPr>
+          <p:nvPr/>
+        </p:nvCxnSpPr>
+        <p:spPr>
+          <a:xfrm>
+            <a:off x="6715845" y="3573533"/>
+            <a:ext cx="510590" cy="1048708"/>
+          </a:xfrm>
+          <a:prstGeom prst="straightConnector1">
+            <a:avLst/>
+          </a:prstGeom>
+          <a:ln>
+            <a:solidFill>
+              <a:schemeClr val="tx1">
+                <a:lumMod val="50000"/>
+                <a:lumOff val="50000"/>
+              </a:schemeClr>
+            </a:solidFill>
+            <a:prstDash val="dash"/>
+            <a:tailEnd type="triangle" w="sm" len="sm"/>
+          </a:ln>
+        </p:spPr>
+        <p:style>
+          <a:lnRef idx="1">
+            <a:schemeClr val="accent1"/>
+          </a:lnRef>
+          <a:fillRef idx="0">
+            <a:schemeClr val="accent1"/>
+          </a:fillRef>
+          <a:effectRef idx="0">
+            <a:schemeClr val="accent1"/>
+          </a:effectRef>
+          <a:fontRef idx="minor">
+            <a:schemeClr val="tx1"/>
+          </a:fontRef>
+        </p:style>
+      </p:cxnSp>
+      <p:cxnSp>
+        <p:nvCxnSpPr>
+          <p:cNvPr id="48" name="Straight Arrow Connector 47">
+            <a:extLst>
+              <a:ext uri="{FF2B5EF4-FFF2-40B4-BE49-F238E27FC236}">
+                <a16:creationId xmlns:a16="http://schemas.microsoft.com/office/drawing/2014/main" id="{36D48A93-F7DB-0386-BF4B-905D5E54AC88}"/>
+              </a:ext>
+            </a:extLst>
+          </p:cNvPr>
+          <p:cNvCxnSpPr>
+            <a:cxnSpLocks/>
+            <a:stCxn id="6" idx="3"/>
+            <a:endCxn id="36" idx="0"/>
+          </p:cNvCxnSpPr>
+          <p:nvPr/>
+        </p:nvCxnSpPr>
+        <p:spPr>
+          <a:xfrm>
+            <a:off x="6605208" y="2258341"/>
+            <a:ext cx="621227" cy="2363900"/>
+          </a:xfrm>
+          <a:prstGeom prst="straightConnector1">
+            <a:avLst/>
+          </a:prstGeom>
+          <a:ln>
+            <a:solidFill>
+              <a:schemeClr val="tx1">
+                <a:lumMod val="50000"/>
+                <a:lumOff val="50000"/>
+              </a:schemeClr>
+            </a:solidFill>
+            <a:prstDash val="dash"/>
+            <a:tailEnd type="triangle" w="sm" len="sm"/>
+          </a:ln>
+        </p:spPr>
+        <p:style>
+          <a:lnRef idx="1">
+            <a:schemeClr val="accent1"/>
+          </a:lnRef>
+          <a:fillRef idx="0">
+            <a:schemeClr val="accent1"/>
+          </a:fillRef>
+          <a:effectRef idx="0">
+            <a:schemeClr val="accent1"/>
+          </a:effectRef>
+          <a:fontRef idx="minor">
+            <a:schemeClr val="tx1"/>
+          </a:fontRef>
+        </p:style>
+      </p:cxnSp>
+      <p:sp>
+        <p:nvSpPr>
+          <p:cNvPr id="49" name="직사각형 256">
+            <a:extLst>
+              <a:ext uri="{FF2B5EF4-FFF2-40B4-BE49-F238E27FC236}">
+                <a16:creationId xmlns:a16="http://schemas.microsoft.com/office/drawing/2014/main" id="{ACA81B1E-26CC-6FA8-F84A-54CD94081CCF}"/>
+              </a:ext>
+            </a:extLst>
+          </p:cNvPr>
+          <p:cNvSpPr/>
+          <p:nvPr/>
+        </p:nvSpPr>
+        <p:spPr>
+          <a:xfrm>
+            <a:off x="5938166" y="3966746"/>
+            <a:ext cx="999056" cy="151388"/>
+          </a:xfrm>
+          <a:prstGeom prst="rect">
+            <a:avLst/>
+          </a:prstGeom>
+        </p:spPr>
+        <p:txBody>
+          <a:bodyPr wrap="none" lIns="0" tIns="0" rIns="0" bIns="0">
+            <a:spAutoFit/>
+          </a:bodyPr>
+          <a:lstStyle/>
+          <a:p>
+            <a:pPr algn="ctr">
+              <a:lnSpc>
+                <a:spcPct val="80000"/>
+              </a:lnSpc>
+            </a:pPr>
+            <a:r>
+              <a:rPr lang="en-US" altLang="ko-KR" sz="1200" dirty="0">
+                <a:solidFill>
+                  <a:prstClr val="black"/>
+                </a:solidFill>
+                <a:latin typeface="Calibri" panose="020F0502020204030204" pitchFamily="34" charset="0"/>
+              </a:rPr>
+              <a:t>Azure Functions</a:t>
+            </a:r>
+            <a:endParaRPr lang="ko-KR" altLang="en-US" sz="1200" dirty="0">
+              <a:solidFill>
+                <a:prstClr val="black"/>
+              </a:solidFill>
+              <a:latin typeface="Calibri" panose="020F0502020204030204" pitchFamily="34" charset="0"/>
+            </a:endParaRPr>
+          </a:p>
+        </p:txBody>
+      </p:sp>
+      <p:sp>
+        <p:nvSpPr>
+          <p:cNvPr id="50" name="직사각형 256">
+            <a:extLst>
+              <a:ext uri="{FF2B5EF4-FFF2-40B4-BE49-F238E27FC236}">
+                <a16:creationId xmlns:a16="http://schemas.microsoft.com/office/drawing/2014/main" id="{64CB7892-4345-77B8-EC16-79410C0855DC}"/>
+              </a:ext>
+            </a:extLst>
+          </p:cNvPr>
+          <p:cNvSpPr/>
+          <p:nvPr/>
+        </p:nvSpPr>
+        <p:spPr>
+          <a:xfrm>
+            <a:off x="5972198" y="2628737"/>
+            <a:ext cx="820353" cy="151388"/>
+          </a:xfrm>
+          <a:prstGeom prst="rect">
+            <a:avLst/>
+          </a:prstGeom>
+        </p:spPr>
+        <p:txBody>
+          <a:bodyPr wrap="none" lIns="0" tIns="0" rIns="0" bIns="0">
+            <a:spAutoFit/>
+          </a:bodyPr>
+          <a:lstStyle/>
+          <a:p>
+            <a:pPr algn="ctr">
+              <a:lnSpc>
+                <a:spcPct val="80000"/>
+              </a:lnSpc>
+            </a:pPr>
+            <a:r>
+              <a:rPr lang="en-US" altLang="ko-KR" sz="1200" dirty="0">
+                <a:solidFill>
+                  <a:prstClr val="black"/>
+                </a:solidFill>
+                <a:latin typeface="Calibri" panose="020F0502020204030204" pitchFamily="34" charset="0"/>
+              </a:rPr>
+              <a:t>AWS Lambda</a:t>
+            </a:r>
+            <a:endParaRPr lang="ko-KR" altLang="en-US" sz="1200" dirty="0">
+              <a:solidFill>
+                <a:prstClr val="black"/>
+              </a:solidFill>
+              <a:latin typeface="Calibri" panose="020F0502020204030204" pitchFamily="34" charset="0"/>
+            </a:endParaRPr>
+          </a:p>
+        </p:txBody>
+      </p:sp>
+      <p:sp>
+        <p:nvSpPr>
+          <p:cNvPr id="51" name="직사각형 256">
+            <a:extLst>
+              <a:ext uri="{FF2B5EF4-FFF2-40B4-BE49-F238E27FC236}">
+                <a16:creationId xmlns:a16="http://schemas.microsoft.com/office/drawing/2014/main" id="{F23AB1D4-223C-4B37-A853-5194A5AC52CA}"/>
+              </a:ext>
+            </a:extLst>
+          </p:cNvPr>
+          <p:cNvSpPr/>
+          <p:nvPr/>
+        </p:nvSpPr>
+        <p:spPr>
+          <a:xfrm>
+            <a:off x="9223074" y="4723116"/>
+            <a:ext cx="939360" cy="615553"/>
+          </a:xfrm>
+          <a:prstGeom prst="rect">
+            <a:avLst/>
+          </a:prstGeom>
+        </p:spPr>
+        <p:txBody>
+          <a:bodyPr wrap="none" lIns="0" tIns="0" rIns="0" bIns="0">
+            <a:spAutoFit/>
+          </a:bodyPr>
+          <a:lstStyle/>
+          <a:p>
+            <a:pPr marL="171450" indent="-171450">
+              <a:buFont typeface="Arial" panose="020B0604020202020204" pitchFamily="34" charset="0"/>
+              <a:buChar char="•"/>
+            </a:pPr>
+            <a:r>
+              <a:rPr lang="en-US" altLang="ko-KR" sz="1000" dirty="0">
+                <a:solidFill>
+                  <a:schemeClr val="bg1">
+                    <a:lumMod val="65000"/>
+                  </a:schemeClr>
+                </a:solidFill>
+                <a:latin typeface="Calibri" panose="020F0502020204030204" pitchFamily="34" charset="0"/>
+              </a:rPr>
+              <a:t>Products</a:t>
+            </a:r>
+          </a:p>
+          <a:p>
+            <a:pPr marL="171450" indent="-171450">
+              <a:buFont typeface="Arial" panose="020B0604020202020204" pitchFamily="34" charset="0"/>
+              <a:buChar char="•"/>
+            </a:pPr>
+            <a:r>
+              <a:rPr lang="en-US" altLang="ko-KR" sz="1000" dirty="0">
+                <a:solidFill>
+                  <a:schemeClr val="bg1">
+                    <a:lumMod val="65000"/>
+                  </a:schemeClr>
+                </a:solidFill>
+                <a:latin typeface="Calibri" panose="020F0502020204030204" pitchFamily="34" charset="0"/>
+              </a:rPr>
+              <a:t>Pricing Models</a:t>
+            </a:r>
+          </a:p>
+          <a:p>
+            <a:pPr marL="171450" indent="-171450">
+              <a:buFont typeface="Arial" panose="020B0604020202020204" pitchFamily="34" charset="0"/>
+              <a:buChar char="•"/>
+            </a:pPr>
+            <a:r>
+              <a:rPr lang="en-US" altLang="ko-KR" sz="1000" dirty="0">
+                <a:solidFill>
+                  <a:schemeClr val="bg1">
+                    <a:lumMod val="65000"/>
+                  </a:schemeClr>
+                </a:solidFill>
+                <a:latin typeface="Calibri" panose="020F0502020204030204" pitchFamily="34" charset="0"/>
+              </a:rPr>
+              <a:t>Billing Plans</a:t>
+            </a:r>
+          </a:p>
+          <a:p>
+            <a:pPr marL="171450" indent="-171450">
+              <a:buFont typeface="Arial" panose="020B0604020202020204" pitchFamily="34" charset="0"/>
+              <a:buChar char="•"/>
+            </a:pPr>
+            <a:r>
+              <a:rPr lang="en-US" altLang="ko-KR" sz="1000" dirty="0">
+                <a:solidFill>
+                  <a:schemeClr val="bg1">
+                    <a:lumMod val="65000"/>
+                  </a:schemeClr>
+                </a:solidFill>
+                <a:latin typeface="Calibri" panose="020F0502020204030204" pitchFamily="34" charset="0"/>
+              </a:rPr>
+              <a:t>Subscriptions</a:t>
+            </a:r>
+            <a:endParaRPr lang="ko-KR" altLang="en-US" sz="1000" dirty="0">
+              <a:solidFill>
+                <a:schemeClr val="bg1">
+                  <a:lumMod val="65000"/>
+                </a:schemeClr>
+              </a:solidFill>
+              <a:latin typeface="Calibri" panose="020F0502020204030204" pitchFamily="34" charset="0"/>
+            </a:endParaRPr>
+          </a:p>
+        </p:txBody>
+      </p:sp>
+      <p:pic>
+        <p:nvPicPr>
+          <p:cNvPr id="52" name="Picture 6">
+            <a:extLst>
+              <a:ext uri="{FF2B5EF4-FFF2-40B4-BE49-F238E27FC236}">
+                <a16:creationId xmlns:a16="http://schemas.microsoft.com/office/drawing/2014/main" id="{11C5B7C6-610D-A6D2-5AE8-0139DE9202AD}"/>
+              </a:ext>
+            </a:extLst>
+          </p:cNvPr>
+          <p:cNvPicPr>
+            <a:picLocks noChangeAspect="1" noChangeArrowheads="1"/>
+          </p:cNvPicPr>
+          <p:nvPr/>
+        </p:nvPicPr>
+        <p:blipFill>
+          <a:blip r:embed="rId13">
+            <a:extLst>
+              <a:ext uri="{28A0092B-C50C-407E-A947-70E740481C1C}">
+                <a14:useLocalDpi xmlns:a14="http://schemas.microsoft.com/office/drawing/2010/main" val="0"/>
+              </a:ext>
+            </a:extLst>
+          </a:blip>
+          <a:srcRect/>
+          <a:stretch>
+            <a:fillRect/>
+          </a:stretch>
+        </p:blipFill>
+        <p:spPr bwMode="auto">
+          <a:xfrm>
+            <a:off x="9032204" y="1868570"/>
+            <a:ext cx="492620" cy="202326"/>
+          </a:xfrm>
+          <a:prstGeom prst="rect">
+            <a:avLst/>
+          </a:prstGeom>
+          <a:noFill/>
+          <a:extLst>
+            <a:ext uri="{909E8E84-426E-40DD-AFC4-6F175D3DCCD1}">
+              <a14:hiddenFill xmlns:a14="http://schemas.microsoft.com/office/drawing/2010/main">
+                <a:solidFill>
+                  <a:srgbClr val="FFFFFF"/>
+                </a:solidFill>
+              </a14:hiddenFill>
+            </a:ext>
+          </a:extLst>
+        </p:spPr>
+      </p:pic>
+      <p:pic>
+        <p:nvPicPr>
+          <p:cNvPr id="53" name="Picture 8">
+            <a:extLst>
+              <a:ext uri="{FF2B5EF4-FFF2-40B4-BE49-F238E27FC236}">
+                <a16:creationId xmlns:a16="http://schemas.microsoft.com/office/drawing/2014/main" id="{DA6EB8F5-59FF-6262-9BE7-137CD275BDCE}"/>
+              </a:ext>
+            </a:extLst>
+          </p:cNvPr>
+          <p:cNvPicPr>
+            <a:picLocks noChangeAspect="1" noChangeArrowheads="1"/>
+          </p:cNvPicPr>
+          <p:nvPr/>
+        </p:nvPicPr>
+        <p:blipFill>
+          <a:blip r:embed="rId14">
+            <a:extLst>
+              <a:ext uri="{28A0092B-C50C-407E-A947-70E740481C1C}">
+                <a14:useLocalDpi xmlns:a14="http://schemas.microsoft.com/office/drawing/2010/main" val="0"/>
+              </a:ext>
+            </a:extLst>
+          </a:blip>
+          <a:srcRect/>
+          <a:stretch>
+            <a:fillRect/>
+          </a:stretch>
+        </p:blipFill>
+        <p:spPr bwMode="auto">
+          <a:xfrm>
+            <a:off x="9638408" y="1872926"/>
+            <a:ext cx="732252" cy="196908"/>
+          </a:xfrm>
+          <a:prstGeom prst="rect">
+            <a:avLst/>
+          </a:prstGeom>
+          <a:noFill/>
+          <a:extLst>
+            <a:ext uri="{909E8E84-426E-40DD-AFC4-6F175D3DCCD1}">
+              <a14:hiddenFill xmlns:a14="http://schemas.microsoft.com/office/drawing/2010/main">
+                <a:solidFill>
+                  <a:srgbClr val="FFFFFF"/>
+                </a:solidFill>
+              </a14:hiddenFill>
+            </a:ext>
+          </a:extLst>
+        </p:spPr>
+      </p:pic>
+      <p:pic>
+        <p:nvPicPr>
+          <p:cNvPr id="54" name="Picture 53">
+            <a:extLst>
+              <a:ext uri="{FF2B5EF4-FFF2-40B4-BE49-F238E27FC236}">
+                <a16:creationId xmlns:a16="http://schemas.microsoft.com/office/drawing/2014/main" id="{BB24968C-7F61-D299-724F-6636E403F000}"/>
+              </a:ext>
+            </a:extLst>
+          </p:cNvPr>
+          <p:cNvPicPr>
+            <a:picLocks noChangeAspect="1"/>
+          </p:cNvPicPr>
+          <p:nvPr/>
+        </p:nvPicPr>
+        <p:blipFill>
+          <a:blip r:embed="rId15"/>
+          <a:stretch>
+            <a:fillRect/>
+          </a:stretch>
+        </p:blipFill>
+        <p:spPr>
+          <a:xfrm>
+            <a:off x="8980503" y="2704431"/>
+            <a:ext cx="514298" cy="336330"/>
+          </a:xfrm>
+          <a:prstGeom prst="rect">
+            <a:avLst/>
+          </a:prstGeom>
+        </p:spPr>
+      </p:pic>
+      <p:pic>
+        <p:nvPicPr>
+          <p:cNvPr id="55" name="Picture 28">
+            <a:extLst>
+              <a:ext uri="{FF2B5EF4-FFF2-40B4-BE49-F238E27FC236}">
+                <a16:creationId xmlns:a16="http://schemas.microsoft.com/office/drawing/2014/main" id="{A997358F-2112-051A-CC79-26215BF28BB6}"/>
+              </a:ext>
+            </a:extLst>
+          </p:cNvPr>
+          <p:cNvPicPr>
+            <a:picLocks noChangeAspect="1" noChangeArrowheads="1"/>
+          </p:cNvPicPr>
+          <p:nvPr/>
+        </p:nvPicPr>
+        <p:blipFill>
+          <a:blip r:embed="rId16">
+            <a:extLst>
+              <a:ext uri="{28A0092B-C50C-407E-A947-70E740481C1C}">
+                <a14:useLocalDpi xmlns:a14="http://schemas.microsoft.com/office/drawing/2010/main" val="0"/>
+              </a:ext>
+            </a:extLst>
+          </a:blip>
+          <a:srcRect/>
+          <a:stretch>
+            <a:fillRect/>
+          </a:stretch>
+        </p:blipFill>
+        <p:spPr bwMode="auto">
+          <a:xfrm>
+            <a:off x="9560280" y="2706318"/>
+            <a:ext cx="323429" cy="323429"/>
+          </a:xfrm>
+          <a:prstGeom prst="rect">
+            <a:avLst/>
+          </a:prstGeom>
+          <a:noFill/>
+          <a:extLst>
+            <a:ext uri="{909E8E84-426E-40DD-AFC4-6F175D3DCCD1}">
+              <a14:hiddenFill xmlns:a14="http://schemas.microsoft.com/office/drawing/2010/main">
+                <a:solidFill>
+                  <a:srgbClr val="FFFFFF"/>
+                </a:solidFill>
+              </a14:hiddenFill>
+            </a:ext>
+          </a:extLst>
+        </p:spPr>
+      </p:pic>
+      <p:pic>
+        <p:nvPicPr>
+          <p:cNvPr id="56" name="Picture 36" descr="Naver starts a credit card-like post-payment service.">
+            <a:extLst>
+              <a:ext uri="{FF2B5EF4-FFF2-40B4-BE49-F238E27FC236}">
+                <a16:creationId xmlns:a16="http://schemas.microsoft.com/office/drawing/2014/main" id="{DB6D858E-98A7-B813-FD14-DBC10E0094C0}"/>
+              </a:ext>
+            </a:extLst>
+          </p:cNvPr>
+          <p:cNvPicPr>
+            <a:picLocks noChangeAspect="1" noChangeArrowheads="1"/>
+          </p:cNvPicPr>
+          <p:nvPr/>
+        </p:nvPicPr>
+        <p:blipFill>
+          <a:blip r:embed="rId17">
+            <a:extLst>
+              <a:ext uri="{28A0092B-C50C-407E-A947-70E740481C1C}">
+                <a14:useLocalDpi xmlns:a14="http://schemas.microsoft.com/office/drawing/2010/main" val="0"/>
+              </a:ext>
+            </a:extLst>
+          </a:blip>
+          <a:srcRect/>
+          <a:stretch>
+            <a:fillRect/>
+          </a:stretch>
+        </p:blipFill>
+        <p:spPr bwMode="auto">
+          <a:xfrm>
+            <a:off x="9000220" y="3417671"/>
+            <a:ext cx="492712" cy="246356"/>
+          </a:xfrm>
+          <a:prstGeom prst="rect">
+            <a:avLst/>
+          </a:prstGeom>
+          <a:noFill/>
+          <a:extLst>
+            <a:ext uri="{909E8E84-426E-40DD-AFC4-6F175D3DCCD1}">
+              <a14:hiddenFill xmlns:a14="http://schemas.microsoft.com/office/drawing/2010/main">
+                <a:solidFill>
+                  <a:srgbClr val="FFFFFF"/>
+                </a:solidFill>
+              </a14:hiddenFill>
+            </a:ext>
+          </a:extLst>
+        </p:spPr>
+      </p:pic>
+      <p:pic>
+        <p:nvPicPr>
+          <p:cNvPr id="57" name="Picture 38" descr="Square Review 2022 | Squareup Reviews, Payments, Products, Pricing">
+            <a:extLst>
+              <a:ext uri="{FF2B5EF4-FFF2-40B4-BE49-F238E27FC236}">
+                <a16:creationId xmlns:a16="http://schemas.microsoft.com/office/drawing/2014/main" id="{F66CCC5E-C95C-6617-27F7-BC3D0C2601A9}"/>
+              </a:ext>
+            </a:extLst>
+          </p:cNvPr>
+          <p:cNvPicPr>
+            <a:picLocks noChangeAspect="1" noChangeArrowheads="1"/>
+          </p:cNvPicPr>
+          <p:nvPr/>
+        </p:nvPicPr>
+        <p:blipFill>
+          <a:blip r:embed="rId18">
+            <a:extLst>
+              <a:ext uri="{28A0092B-C50C-407E-A947-70E740481C1C}">
+                <a14:useLocalDpi xmlns:a14="http://schemas.microsoft.com/office/drawing/2010/main" val="0"/>
+              </a:ext>
+            </a:extLst>
+          </a:blip>
+          <a:srcRect/>
+          <a:stretch>
+            <a:fillRect/>
+          </a:stretch>
+        </p:blipFill>
+        <p:spPr bwMode="auto">
+          <a:xfrm>
+            <a:off x="9014391" y="2268089"/>
+            <a:ext cx="791147" cy="196908"/>
+          </a:xfrm>
+          <a:prstGeom prst="rect">
+            <a:avLst/>
+          </a:prstGeom>
+          <a:noFill/>
+          <a:extLst>
+            <a:ext uri="{909E8E84-426E-40DD-AFC4-6F175D3DCCD1}">
+              <a14:hiddenFill xmlns:a14="http://schemas.microsoft.com/office/drawing/2010/main">
+                <a:solidFill>
+                  <a:srgbClr val="FFFFFF"/>
+                </a:solidFill>
+              </a14:hiddenFill>
+            </a:ext>
+          </a:extLst>
+        </p:spPr>
+      </p:pic>
+      <p:pic>
+        <p:nvPicPr>
+          <p:cNvPr id="58" name="Picture 57">
+            <a:extLst>
+              <a:ext uri="{FF2B5EF4-FFF2-40B4-BE49-F238E27FC236}">
+                <a16:creationId xmlns:a16="http://schemas.microsoft.com/office/drawing/2014/main" id="{05695BA6-58F3-1A95-7646-73F53EF0E8BD}"/>
+              </a:ext>
+            </a:extLst>
+          </p:cNvPr>
+          <p:cNvPicPr>
+            <a:picLocks noChangeAspect="1"/>
+          </p:cNvPicPr>
+          <p:nvPr/>
+        </p:nvPicPr>
+        <p:blipFill>
+          <a:blip r:embed="rId19"/>
+          <a:stretch>
+            <a:fillRect/>
+          </a:stretch>
+        </p:blipFill>
+        <p:spPr>
+          <a:xfrm>
+            <a:off x="9585852" y="3405081"/>
+            <a:ext cx="1079487" cy="246356"/>
+          </a:xfrm>
+          <a:prstGeom prst="rect">
+            <a:avLst/>
+          </a:prstGeom>
+        </p:spPr>
+      </p:pic>
+      <p:pic>
+        <p:nvPicPr>
+          <p:cNvPr id="59" name="Picture 58">
+            <a:extLst>
+              <a:ext uri="{FF2B5EF4-FFF2-40B4-BE49-F238E27FC236}">
+                <a16:creationId xmlns:a16="http://schemas.microsoft.com/office/drawing/2014/main" id="{2A8FC93A-3D76-82D3-E17D-67A049DA5B3F}"/>
+              </a:ext>
+            </a:extLst>
+          </p:cNvPr>
+          <p:cNvPicPr>
+            <a:picLocks noChangeAspect="1"/>
+          </p:cNvPicPr>
+          <p:nvPr/>
+        </p:nvPicPr>
+        <p:blipFill>
+          <a:blip r:embed="rId20"/>
+          <a:stretch>
+            <a:fillRect/>
+          </a:stretch>
+        </p:blipFill>
+        <p:spPr>
+          <a:xfrm>
+            <a:off x="9913611" y="2700247"/>
+            <a:ext cx="720303" cy="350311"/>
+          </a:xfrm>
+          <a:prstGeom prst="rect">
+            <a:avLst/>
+          </a:prstGeom>
+        </p:spPr>
+      </p:pic>
+    </p:spTree>
+    <p:extLst>
+      <p:ext uri="{BB962C8B-B14F-4D97-AF65-F5344CB8AC3E}">
+        <p14:creationId xmlns:p14="http://schemas.microsoft.com/office/powerpoint/2010/main" val="848786593"/>
+      </p:ext>
+    </p:extLst>
+  </p:cSld>
+  <p:clrMapOvr>
+    <a:masterClrMapping/>
+  </p:clrMapOvr>
+</p:sld>
+</file>
+
+<file path=ppt/slides/slide2.xml><?xml version="1.0" encoding="utf-8"?>
+<p:sld xmlns:a="http://schemas.openxmlformats.org/drawingml/2006/main" xmlns:r="http://schemas.openxmlformats.org/officeDocument/2006/relationships" xmlns:p="http://schemas.openxmlformats.org/presentationml/2006/main">
+  <p:cSld>
+    <p:spTree>
+      <p:nvGrpSpPr>
+        <p:cNvPr id="1" name=""/>
+        <p:cNvGrpSpPr/>
+        <p:nvPr/>
+      </p:nvGrpSpPr>
+      <p:grpSpPr>
+        <a:xfrm>
+          <a:off x="0" y="0"/>
+          <a:ext cx="0" cy="0"/>
+          <a:chOff x="0" y="0"/>
+          <a:chExt cx="0" cy="0"/>
+        </a:xfrm>
+      </p:grpSpPr>
+      <p:pic>
+        <p:nvPicPr>
+          <p:cNvPr id="4" name="Picture 2" descr="Image result for nginx">
+            <a:extLst>
+              <a:ext uri="{FF2B5EF4-FFF2-40B4-BE49-F238E27FC236}">
                 <a16:creationId xmlns:a16="http://schemas.microsoft.com/office/drawing/2014/main" id="{56A80FE4-EB96-4E6A-56F4-EECE294569FA}"/>
               </a:ext>
             </a:extLst>

</xml_diff>